<commit_message>
Update tests after merging in changes to agendalab
</commit_message>
<xml_diff>
--- a/doc/test/AgendaSlidesBeamAfterSync.pptx
+++ b/doc/test/AgendaSlidesBeamAfterSync.pptx
@@ -167,7 +167,7 @@
       </p14:sectionLst>
     </p:ext>
     <p:ext uri="{EFAFB233-063F-42B5-8137-9DF3F51BA10A}">
-      <p15:sldGuideLst xmlns="" xmlns:p15="http://schemas.microsoft.com/office/powerpoint/2012/main">
+      <p15:sldGuideLst xmlns:p15="http://schemas.microsoft.com/office/powerpoint/2012/main" xmlns="">
         <p15:guide id="1" orient="horz" pos="2160">
           <p15:clr>
             <a:srgbClr val="A4A3A4"/>
@@ -365,7 +365,7 @@
           <a:p>
             <a:fld id="{699DC775-C286-4358-8C92-D7E584E969B3}" type="datetimeFigureOut">
               <a:rPr lang="en-US" smtClean="0"/>
-              <a:t>19-Jun-15</a:t>
+              <a:t>30-Jun-15</a:t>
             </a:fld>
             <a:endParaRPr lang="en-US"/>
           </a:p>
@@ -535,7 +535,7 @@
           <a:p>
             <a:fld id="{699DC775-C286-4358-8C92-D7E584E969B3}" type="datetimeFigureOut">
               <a:rPr lang="en-US" smtClean="0"/>
-              <a:t>19-Jun-15</a:t>
+              <a:t>30-Jun-15</a:t>
             </a:fld>
             <a:endParaRPr lang="en-US"/>
           </a:p>
@@ -715,7 +715,7 @@
           <a:p>
             <a:fld id="{699DC775-C286-4358-8C92-D7E584E969B3}" type="datetimeFigureOut">
               <a:rPr lang="en-US" smtClean="0"/>
-              <a:t>19-Jun-15</a:t>
+              <a:t>30-Jun-15</a:t>
             </a:fld>
             <a:endParaRPr lang="en-US"/>
           </a:p>
@@ -957,7 +957,7 @@
           <a:p>
             <a:fld id="{699DC775-C286-4358-8C92-D7E584E969B3}" type="datetimeFigureOut">
               <a:rPr lang="en-US" smtClean="0"/>
-              <a:t>19-Jun-15</a:t>
+              <a:t>30-Jun-15</a:t>
             </a:fld>
             <a:endParaRPr lang="en-US"/>
           </a:p>
@@ -1127,7 +1127,7 @@
           <a:p>
             <a:fld id="{699DC775-C286-4358-8C92-D7E584E969B3}" type="datetimeFigureOut">
               <a:rPr lang="en-US" smtClean="0"/>
-              <a:t>19-Jun-15</a:t>
+              <a:t>30-Jun-15</a:t>
             </a:fld>
             <a:endParaRPr lang="en-US"/>
           </a:p>
@@ -1373,7 +1373,7 @@
           <a:p>
             <a:fld id="{699DC775-C286-4358-8C92-D7E584E969B3}" type="datetimeFigureOut">
               <a:rPr lang="en-US" smtClean="0"/>
-              <a:t>19-Jun-15</a:t>
+              <a:t>30-Jun-15</a:t>
             </a:fld>
             <a:endParaRPr lang="en-US"/>
           </a:p>
@@ -1661,7 +1661,7 @@
           <a:p>
             <a:fld id="{699DC775-C286-4358-8C92-D7E584E969B3}" type="datetimeFigureOut">
               <a:rPr lang="en-US" smtClean="0"/>
-              <a:t>19-Jun-15</a:t>
+              <a:t>30-Jun-15</a:t>
             </a:fld>
             <a:endParaRPr lang="en-US"/>
           </a:p>
@@ -2083,7 +2083,7 @@
           <a:p>
             <a:fld id="{699DC775-C286-4358-8C92-D7E584E969B3}" type="datetimeFigureOut">
               <a:rPr lang="en-US" smtClean="0"/>
-              <a:t>19-Jun-15</a:t>
+              <a:t>30-Jun-15</a:t>
             </a:fld>
             <a:endParaRPr lang="en-US"/>
           </a:p>
@@ -2201,7 +2201,7 @@
           <a:p>
             <a:fld id="{699DC775-C286-4358-8C92-D7E584E969B3}" type="datetimeFigureOut">
               <a:rPr lang="en-US" smtClean="0"/>
-              <a:t>19-Jun-15</a:t>
+              <a:t>30-Jun-15</a:t>
             </a:fld>
             <a:endParaRPr lang="en-US"/>
           </a:p>
@@ -2296,7 +2296,7 @@
           <a:p>
             <a:fld id="{699DC775-C286-4358-8C92-D7E584E969B3}" type="datetimeFigureOut">
               <a:rPr lang="en-US" smtClean="0"/>
-              <a:t>19-Jun-15</a:t>
+              <a:t>30-Jun-15</a:t>
             </a:fld>
             <a:endParaRPr lang="en-US"/>
           </a:p>
@@ -2573,7 +2573,7 @@
           <a:p>
             <a:fld id="{699DC775-C286-4358-8C92-D7E584E969B3}" type="datetimeFigureOut">
               <a:rPr lang="en-US" smtClean="0"/>
-              <a:t>19-Jun-15</a:t>
+              <a:t>30-Jun-15</a:t>
             </a:fld>
             <a:endParaRPr lang="en-US"/>
           </a:p>
@@ -2743,7 +2743,7 @@
           <a:p>
             <a:fld id="{699DC775-C286-4358-8C92-D7E584E969B3}" type="datetimeFigureOut">
               <a:rPr lang="en-US" smtClean="0"/>
-              <a:t>19-Jun-15</a:t>
+              <a:t>30-Jun-15</a:t>
             </a:fld>
             <a:endParaRPr lang="en-US"/>
           </a:p>
@@ -2996,7 +2996,7 @@
           <a:p>
             <a:fld id="{699DC775-C286-4358-8C92-D7E584E969B3}" type="datetimeFigureOut">
               <a:rPr lang="en-US" smtClean="0"/>
-              <a:t>19-Jun-15</a:t>
+              <a:t>30-Jun-15</a:t>
             </a:fld>
             <a:endParaRPr lang="en-US"/>
           </a:p>
@@ -3166,7 +3166,7 @@
           <a:p>
             <a:fld id="{699DC775-C286-4358-8C92-D7E584E969B3}" type="datetimeFigureOut">
               <a:rPr lang="en-US" smtClean="0"/>
-              <a:t>19-Jun-15</a:t>
+              <a:t>30-Jun-15</a:t>
             </a:fld>
             <a:endParaRPr lang="en-US"/>
           </a:p>
@@ -3346,7 +3346,7 @@
           <a:p>
             <a:fld id="{699DC775-C286-4358-8C92-D7E584E969B3}" type="datetimeFigureOut">
               <a:rPr lang="en-US" smtClean="0"/>
-              <a:t>19-Jun-15</a:t>
+              <a:t>30-Jun-15</a:t>
             </a:fld>
             <a:endParaRPr lang="en-US"/>
           </a:p>
@@ -3596,7 +3596,7 @@
           <a:p>
             <a:fld id="{699DC775-C286-4358-8C92-D7E584E969B3}" type="datetimeFigureOut">
               <a:rPr lang="en-US" smtClean="0"/>
-              <a:t>19-Jun-15</a:t>
+              <a:t>30-Jun-15</a:t>
             </a:fld>
             <a:endParaRPr lang="en-US"/>
           </a:p>
@@ -3774,7 +3774,7 @@
           <a:p>
             <a:fld id="{699DC775-C286-4358-8C92-D7E584E969B3}" type="datetimeFigureOut">
               <a:rPr lang="en-US" smtClean="0"/>
-              <a:t>19-Jun-15</a:t>
+              <a:t>30-Jun-15</a:t>
             </a:fld>
             <a:endParaRPr lang="en-US"/>
           </a:p>
@@ -4028,7 +4028,7 @@
           <a:p>
             <a:fld id="{699DC775-C286-4358-8C92-D7E584E969B3}" type="datetimeFigureOut">
               <a:rPr lang="en-US" smtClean="0"/>
-              <a:t>19-Jun-15</a:t>
+              <a:t>30-Jun-15</a:t>
             </a:fld>
             <a:endParaRPr lang="en-US"/>
           </a:p>
@@ -4324,7 +4324,7 @@
           <a:p>
             <a:fld id="{699DC775-C286-4358-8C92-D7E584E969B3}" type="datetimeFigureOut">
               <a:rPr lang="en-US" smtClean="0"/>
-              <a:t>19-Jun-15</a:t>
+              <a:t>30-Jun-15</a:t>
             </a:fld>
             <a:endParaRPr lang="en-US"/>
           </a:p>
@@ -4754,7 +4754,7 @@
           <a:p>
             <a:fld id="{699DC775-C286-4358-8C92-D7E584E969B3}" type="datetimeFigureOut">
               <a:rPr lang="en-US" smtClean="0"/>
-              <a:t>19-Jun-15</a:t>
+              <a:t>30-Jun-15</a:t>
             </a:fld>
             <a:endParaRPr lang="en-US"/>
           </a:p>
@@ -4880,7 +4880,7 @@
           <a:p>
             <a:fld id="{699DC775-C286-4358-8C92-D7E584E969B3}" type="datetimeFigureOut">
               <a:rPr lang="en-US" smtClean="0"/>
-              <a:t>19-Jun-15</a:t>
+              <a:t>30-Jun-15</a:t>
             </a:fld>
             <a:endParaRPr lang="en-US"/>
           </a:p>
@@ -4983,7 +4983,7 @@
           <a:p>
             <a:fld id="{699DC775-C286-4358-8C92-D7E584E969B3}" type="datetimeFigureOut">
               <a:rPr lang="en-US" smtClean="0"/>
-              <a:t>19-Jun-15</a:t>
+              <a:t>30-Jun-15</a:t>
             </a:fld>
             <a:endParaRPr lang="en-US"/>
           </a:p>
@@ -5229,7 +5229,7 @@
           <a:p>
             <a:fld id="{699DC775-C286-4358-8C92-D7E584E969B3}" type="datetimeFigureOut">
               <a:rPr lang="en-US" smtClean="0"/>
-              <a:t>19-Jun-15</a:t>
+              <a:t>30-Jun-15</a:t>
             </a:fld>
             <a:endParaRPr lang="en-US"/>
           </a:p>
@@ -5514,7 +5514,7 @@
           <a:p>
             <a:fld id="{699DC775-C286-4358-8C92-D7E584E969B3}" type="datetimeFigureOut">
               <a:rPr lang="en-US" smtClean="0"/>
-              <a:t>19-Jun-15</a:t>
+              <a:t>30-Jun-15</a:t>
             </a:fld>
             <a:endParaRPr lang="en-US"/>
           </a:p>
@@ -5775,7 +5775,7 @@
           <a:p>
             <a:fld id="{699DC775-C286-4358-8C92-D7E584E969B3}" type="datetimeFigureOut">
               <a:rPr lang="en-US" smtClean="0"/>
-              <a:t>19-Jun-15</a:t>
+              <a:t>30-Jun-15</a:t>
             </a:fld>
             <a:endParaRPr lang="en-US"/>
           </a:p>
@@ -5953,7 +5953,7 @@
           <a:p>
             <a:fld id="{699DC775-C286-4358-8C92-D7E584E969B3}" type="datetimeFigureOut">
               <a:rPr lang="en-US" smtClean="0"/>
-              <a:t>19-Jun-15</a:t>
+              <a:t>30-Jun-15</a:t>
             </a:fld>
             <a:endParaRPr lang="en-US"/>
           </a:p>
@@ -6141,7 +6141,7 @@
           <a:p>
             <a:fld id="{699DC775-C286-4358-8C92-D7E584E969B3}" type="datetimeFigureOut">
               <a:rPr lang="en-US" smtClean="0"/>
-              <a:t>19-Jun-15</a:t>
+              <a:t>30-Jun-15</a:t>
             </a:fld>
             <a:endParaRPr lang="en-US"/>
           </a:p>
@@ -6429,7 +6429,7 @@
           <a:p>
             <a:fld id="{699DC775-C286-4358-8C92-D7E584E969B3}" type="datetimeFigureOut">
               <a:rPr lang="en-US" smtClean="0"/>
-              <a:t>19-Jun-15</a:t>
+              <a:t>30-Jun-15</a:t>
             </a:fld>
             <a:endParaRPr lang="en-US"/>
           </a:p>
@@ -6851,7 +6851,7 @@
           <a:p>
             <a:fld id="{699DC775-C286-4358-8C92-D7E584E969B3}" type="datetimeFigureOut">
               <a:rPr lang="en-US" smtClean="0"/>
-              <a:t>19-Jun-15</a:t>
+              <a:t>30-Jun-15</a:t>
             </a:fld>
             <a:endParaRPr lang="en-US"/>
           </a:p>
@@ -6969,7 +6969,7 @@
           <a:p>
             <a:fld id="{699DC775-C286-4358-8C92-D7E584E969B3}" type="datetimeFigureOut">
               <a:rPr lang="en-US" smtClean="0"/>
-              <a:t>19-Jun-15</a:t>
+              <a:t>30-Jun-15</a:t>
             </a:fld>
             <a:endParaRPr lang="en-US"/>
           </a:p>
@@ -7064,7 +7064,7 @@
           <a:p>
             <a:fld id="{699DC775-C286-4358-8C92-D7E584E969B3}" type="datetimeFigureOut">
               <a:rPr lang="en-US" smtClean="0"/>
-              <a:t>19-Jun-15</a:t>
+              <a:t>30-Jun-15</a:t>
             </a:fld>
             <a:endParaRPr lang="en-US"/>
           </a:p>
@@ -7341,7 +7341,7 @@
           <a:p>
             <a:fld id="{699DC775-C286-4358-8C92-D7E584E969B3}" type="datetimeFigureOut">
               <a:rPr lang="en-US" smtClean="0"/>
-              <a:t>19-Jun-15</a:t>
+              <a:t>30-Jun-15</a:t>
             </a:fld>
             <a:endParaRPr lang="en-US"/>
           </a:p>
@@ -7594,7 +7594,7 @@
           <a:p>
             <a:fld id="{699DC775-C286-4358-8C92-D7E584E969B3}" type="datetimeFigureOut">
               <a:rPr lang="en-US" smtClean="0"/>
-              <a:t>19-Jun-15</a:t>
+              <a:t>30-Jun-15</a:t>
             </a:fld>
             <a:endParaRPr lang="en-US"/>
           </a:p>
@@ -7807,7 +7807,7 @@
           <a:p>
             <a:fld id="{699DC775-C286-4358-8C92-D7E584E969B3}" type="datetimeFigureOut">
               <a:rPr lang="en-US" smtClean="0"/>
-              <a:t>19-Jun-15</a:t>
+              <a:t>30-Jun-15</a:t>
             </a:fld>
             <a:endParaRPr lang="en-US"/>
           </a:p>
@@ -8322,7 +8322,7 @@
           <a:p>
             <a:fld id="{699DC775-C286-4358-8C92-D7E584E969B3}" type="datetimeFigureOut">
               <a:rPr lang="en-US" smtClean="0"/>
-              <a:t>19-Jun-15</a:t>
+              <a:t>30-Jun-15</a:t>
             </a:fld>
             <a:endParaRPr lang="en-US"/>
           </a:p>
@@ -8835,7 +8835,7 @@
           <a:p>
             <a:fld id="{699DC775-C286-4358-8C92-D7E584E969B3}" type="datetimeFigureOut">
               <a:rPr lang="en-US" smtClean="0"/>
-              <a:t>19-Jun-15</a:t>
+              <a:t>30-Jun-15</a:t>
             </a:fld>
             <a:endParaRPr lang="en-US"/>
           </a:p>
@@ -9271,9 +9271,9 @@
         <p:grpSpPr>
           <a:xfrm>
             <a:off x="0" y="0"/>
-            <a:ext cx="9144000" cy="535920"/>
+            <a:ext cx="9144000" cy="892552"/>
             <a:chOff x="0" y="0"/>
-            <a:chExt cx="9144000" cy="535920"/>
+            <a:chExt cx="9144000" cy="892552"/>
           </a:xfrm>
         </p:grpSpPr>
         <p:sp>
@@ -9344,13 +9344,15 @@
           </p:nvSpPr>
           <p:spPr>
             <a:xfrm>
-              <a:off x="483305" y="12700"/>
+              <a:off x="3354315" y="369332"/>
               <a:ext cx="2436885" cy="523220"/>
             </a:xfrm>
             <a:prstGeom prst="rect">
               <a:avLst/>
             </a:prstGeom>
-            <a:noFill/>
+            <a:solidFill>
+              <a:srgbClr val="00B050"/>
+            </a:solidFill>
           </p:spPr>
           <p:txBody>
             <a:bodyPr vert="horz" wrap="none" rtlCol="0">
@@ -11226,11 +11228,11 @@
   <p:clrMapOvr>
     <a:masterClrMapping/>
   </p:clrMapOvr>
-  <mc:AlternateContent xmlns:mc="http://schemas.openxmlformats.org/markup-compatibility/2006">
-    <mc:Choice xmlns:p14="http://schemas.microsoft.com/office/powerpoint/2010/main" Requires="p14">
+  <mc:AlternateContent xmlns:mc="http://schemas.openxmlformats.org/markup-compatibility/2006" xmlns:p14="http://schemas.microsoft.com/office/powerpoint/2010/main">
+    <mc:Choice Requires="p14">
       <p:transition spd="slow" p14:dur="2000"/>
     </mc:Choice>
-    <mc:Fallback>
+    <mc:Fallback xmlns="">
       <p:transition spd="slow"/>
     </mc:Fallback>
   </mc:AlternateContent>
@@ -11551,11 +11553,6 @@
               </a:rPr>
               <a:t>Select slides 5-8 and Sync Agenda.</a:t>
             </a:r>
-            <a:endParaRPr lang="en-US" sz="2400" dirty="0" smtClean="0">
-              <a:solidFill>
-                <a:schemeClr val="bg1"/>
-              </a:solidFill>
-            </a:endParaRPr>
           </a:p>
         </p:txBody>
       </p:sp>

</xml_diff>

<commit_message>
update test case results with new ack slide
</commit_message>
<xml_diff>
--- a/doc/test/AgendaSlidesBeamAfterSync.pptx
+++ b/doc/test/AgendaSlidesBeamAfterSync.pptx
@@ -20,7 +20,7 @@
     <p:sldId id="312" r:id="rId14"/>
     <p:sldId id="313" r:id="rId15"/>
     <p:sldId id="314" r:id="rId16"/>
-    <p:sldId id="316" r:id="rId17"/>
+    <p:sldId id="317" r:id="rId17"/>
   </p:sldIdLst>
   <p:sldSz cx="9144000" cy="6858000" type="screen4x3"/>
   <p:notesSz cx="6858000" cy="9144000"/>
@@ -161,13 +161,13 @@
         <p14:section name="Ω" id="{7DC05ADB-162C-47A0-98D4-E8994A6A2B8E}">
           <p14:sldIdLst>
             <p14:sldId id="314"/>
-            <p14:sldId id="316"/>
+            <p14:sldId id="317"/>
           </p14:sldIdLst>
         </p14:section>
       </p14:sectionLst>
     </p:ext>
     <p:ext uri="{EFAFB233-063F-42B5-8137-9DF3F51BA10A}">
-      <p15:sldGuideLst xmlns:p15="http://schemas.microsoft.com/office/powerpoint/2012/main" xmlns="">
+      <p15:sldGuideLst xmlns:p15="http://schemas.microsoft.com/office/powerpoint/2012/main">
         <p15:guide id="1" orient="horz" pos="2160">
           <p15:clr>
             <a:srgbClr val="A4A3A4"/>
@@ -222,10 +222,9 @@
           <a:lstStyle/>
           <a:p>
             <a:r>
-              <a:rPr lang="en-US" smtClean="0"/>
+              <a:rPr lang="en-US"/>
               <a:t>Click to edit Master title style</a:t>
             </a:r>
-            <a:endParaRPr lang="en-US"/>
           </a:p>
         </p:txBody>
       </p:sp>
@@ -341,10 +340,9 @@
           </a:lstStyle>
           <a:p>
             <a:r>
-              <a:rPr lang="en-US" smtClean="0"/>
+              <a:rPr lang="en-US"/>
               <a:t>Click to edit Master subtitle style</a:t>
             </a:r>
-            <a:endParaRPr lang="en-US"/>
           </a:p>
         </p:txBody>
       </p:sp>
@@ -365,7 +363,7 @@
           <a:p>
             <a:fld id="{699DC775-C286-4358-8C92-D7E584E969B3}" type="datetimeFigureOut">
               <a:rPr lang="en-US" smtClean="0"/>
-              <a:t>30-Jun-15</a:t>
+              <a:t>1/23/2017</a:t>
             </a:fld>
             <a:endParaRPr lang="en-US"/>
           </a:p>
@@ -459,10 +457,9 @@
           <a:lstStyle/>
           <a:p>
             <a:r>
-              <a:rPr lang="en-US" smtClean="0"/>
+              <a:rPr lang="en-US"/>
               <a:t>Click to edit Master title style</a:t>
             </a:r>
-            <a:endParaRPr lang="en-US"/>
           </a:p>
         </p:txBody>
       </p:sp>
@@ -483,38 +480,37 @@
           <a:p>
             <a:pPr lvl="0"/>
             <a:r>
-              <a:rPr lang="en-US" smtClean="0"/>
+              <a:rPr lang="en-US"/>
               <a:t>Click to edit Master text styles</a:t>
             </a:r>
           </a:p>
           <a:p>
             <a:pPr lvl="1"/>
             <a:r>
-              <a:rPr lang="en-US" smtClean="0"/>
+              <a:rPr lang="en-US"/>
               <a:t>Second level</a:t>
             </a:r>
           </a:p>
           <a:p>
             <a:pPr lvl="2"/>
             <a:r>
-              <a:rPr lang="en-US" smtClean="0"/>
+              <a:rPr lang="en-US"/>
               <a:t>Third level</a:t>
             </a:r>
           </a:p>
           <a:p>
             <a:pPr lvl="3"/>
             <a:r>
-              <a:rPr lang="en-US" smtClean="0"/>
+              <a:rPr lang="en-US"/>
               <a:t>Fourth level</a:t>
             </a:r>
           </a:p>
           <a:p>
             <a:pPr lvl="4"/>
             <a:r>
-              <a:rPr lang="en-US" smtClean="0"/>
+              <a:rPr lang="en-US"/>
               <a:t>Fifth level</a:t>
             </a:r>
-            <a:endParaRPr lang="en-US"/>
           </a:p>
         </p:txBody>
       </p:sp>
@@ -535,7 +531,7 @@
           <a:p>
             <a:fld id="{699DC775-C286-4358-8C92-D7E584E969B3}" type="datetimeFigureOut">
               <a:rPr lang="en-US" smtClean="0"/>
-              <a:t>30-Jun-15</a:t>
+              <a:t>1/23/2017</a:t>
             </a:fld>
             <a:endParaRPr lang="en-US"/>
           </a:p>
@@ -634,10 +630,9 @@
           <a:lstStyle/>
           <a:p>
             <a:r>
-              <a:rPr lang="en-US" smtClean="0"/>
+              <a:rPr lang="en-US"/>
               <a:t>Click to edit Master title style</a:t>
             </a:r>
-            <a:endParaRPr lang="en-US"/>
           </a:p>
         </p:txBody>
       </p:sp>
@@ -663,38 +658,37 @@
           <a:p>
             <a:pPr lvl="0"/>
             <a:r>
-              <a:rPr lang="en-US" smtClean="0"/>
+              <a:rPr lang="en-US"/>
               <a:t>Click to edit Master text styles</a:t>
             </a:r>
           </a:p>
           <a:p>
             <a:pPr lvl="1"/>
             <a:r>
-              <a:rPr lang="en-US" smtClean="0"/>
+              <a:rPr lang="en-US"/>
               <a:t>Second level</a:t>
             </a:r>
           </a:p>
           <a:p>
             <a:pPr lvl="2"/>
             <a:r>
-              <a:rPr lang="en-US" smtClean="0"/>
+              <a:rPr lang="en-US"/>
               <a:t>Third level</a:t>
             </a:r>
           </a:p>
           <a:p>
             <a:pPr lvl="3"/>
             <a:r>
-              <a:rPr lang="en-US" smtClean="0"/>
+              <a:rPr lang="en-US"/>
               <a:t>Fourth level</a:t>
             </a:r>
           </a:p>
           <a:p>
             <a:pPr lvl="4"/>
             <a:r>
-              <a:rPr lang="en-US" smtClean="0"/>
+              <a:rPr lang="en-US"/>
               <a:t>Fifth level</a:t>
             </a:r>
-            <a:endParaRPr lang="en-US"/>
           </a:p>
         </p:txBody>
       </p:sp>
@@ -715,7 +709,7 @@
           <a:p>
             <a:fld id="{699DC775-C286-4358-8C92-D7E584E969B3}" type="datetimeFigureOut">
               <a:rPr lang="en-US" smtClean="0"/>
-              <a:t>30-Jun-15</a:t>
+              <a:t>1/23/2017</a:t>
             </a:fld>
             <a:endParaRPr lang="en-US"/>
           </a:p>
@@ -814,10 +808,9 @@
           <a:lstStyle/>
           <a:p>
             <a:r>
-              <a:rPr lang="en-US" smtClean="0"/>
+              <a:rPr lang="en-US"/>
               <a:t>Click to edit Master title style</a:t>
             </a:r>
-            <a:endParaRPr lang="en-US"/>
           </a:p>
         </p:txBody>
       </p:sp>
@@ -933,10 +926,9 @@
           </a:lstStyle>
           <a:p>
             <a:r>
-              <a:rPr lang="en-US" smtClean="0"/>
+              <a:rPr lang="en-US"/>
               <a:t>Click to edit Master subtitle style</a:t>
             </a:r>
-            <a:endParaRPr lang="en-US"/>
           </a:p>
         </p:txBody>
       </p:sp>
@@ -957,7 +949,7 @@
           <a:p>
             <a:fld id="{699DC775-C286-4358-8C92-D7E584E969B3}" type="datetimeFigureOut">
               <a:rPr lang="en-US" smtClean="0"/>
-              <a:t>30-Jun-15</a:t>
+              <a:t>1/23/2017</a:t>
             </a:fld>
             <a:endParaRPr lang="en-US"/>
           </a:p>
@@ -1051,10 +1043,9 @@
           <a:lstStyle/>
           <a:p>
             <a:r>
-              <a:rPr lang="en-US" smtClean="0"/>
+              <a:rPr lang="en-US"/>
               <a:t>Click to edit Master title style</a:t>
             </a:r>
-            <a:endParaRPr lang="en-US"/>
           </a:p>
         </p:txBody>
       </p:sp>
@@ -1075,38 +1066,37 @@
           <a:p>
             <a:pPr lvl="0"/>
             <a:r>
-              <a:rPr lang="en-US" smtClean="0"/>
+              <a:rPr lang="en-US"/>
               <a:t>Click to edit Master text styles</a:t>
             </a:r>
           </a:p>
           <a:p>
             <a:pPr lvl="1"/>
             <a:r>
-              <a:rPr lang="en-US" smtClean="0"/>
+              <a:rPr lang="en-US"/>
               <a:t>Second level</a:t>
             </a:r>
           </a:p>
           <a:p>
             <a:pPr lvl="2"/>
             <a:r>
-              <a:rPr lang="en-US" smtClean="0"/>
+              <a:rPr lang="en-US"/>
               <a:t>Third level</a:t>
             </a:r>
           </a:p>
           <a:p>
             <a:pPr lvl="3"/>
             <a:r>
-              <a:rPr lang="en-US" smtClean="0"/>
+              <a:rPr lang="en-US"/>
               <a:t>Fourth level</a:t>
             </a:r>
           </a:p>
           <a:p>
             <a:pPr lvl="4"/>
             <a:r>
-              <a:rPr lang="en-US" smtClean="0"/>
+              <a:rPr lang="en-US"/>
               <a:t>Fifth level</a:t>
             </a:r>
-            <a:endParaRPr lang="en-US"/>
           </a:p>
         </p:txBody>
       </p:sp>
@@ -1127,7 +1117,7 @@
           <a:p>
             <a:fld id="{699DC775-C286-4358-8C92-D7E584E969B3}" type="datetimeFigureOut">
               <a:rPr lang="en-US" smtClean="0"/>
-              <a:t>30-Jun-15</a:t>
+              <a:t>1/23/2017</a:t>
             </a:fld>
             <a:endParaRPr lang="en-US"/>
           </a:p>
@@ -1230,10 +1220,9 @@
           </a:lstStyle>
           <a:p>
             <a:r>
-              <a:rPr lang="en-US" smtClean="0"/>
+              <a:rPr lang="en-US"/>
               <a:t>Click to edit Master title style</a:t>
             </a:r>
-            <a:endParaRPr lang="en-US"/>
           </a:p>
         </p:txBody>
       </p:sp>
@@ -1350,7 +1339,7 @@
           <a:p>
             <a:pPr lvl="0"/>
             <a:r>
-              <a:rPr lang="en-US" smtClean="0"/>
+              <a:rPr lang="en-US"/>
               <a:t>Click to edit Master text styles</a:t>
             </a:r>
           </a:p>
@@ -1373,7 +1362,7 @@
           <a:p>
             <a:fld id="{699DC775-C286-4358-8C92-D7E584E969B3}" type="datetimeFigureOut">
               <a:rPr lang="en-US" smtClean="0"/>
-              <a:t>30-Jun-15</a:t>
+              <a:t>1/23/2017</a:t>
             </a:fld>
             <a:endParaRPr lang="en-US"/>
           </a:p>
@@ -1467,10 +1456,9 @@
           <a:lstStyle/>
           <a:p>
             <a:r>
-              <a:rPr lang="en-US" smtClean="0"/>
+              <a:rPr lang="en-US"/>
               <a:t>Click to edit Master title style</a:t>
             </a:r>
-            <a:endParaRPr lang="en-US"/>
           </a:p>
         </p:txBody>
       </p:sp>
@@ -1524,38 +1512,37 @@
           <a:p>
             <a:pPr lvl="0"/>
             <a:r>
-              <a:rPr lang="en-US" smtClean="0"/>
+              <a:rPr lang="en-US"/>
               <a:t>Click to edit Master text styles</a:t>
             </a:r>
           </a:p>
           <a:p>
             <a:pPr lvl="1"/>
             <a:r>
-              <a:rPr lang="en-US" smtClean="0"/>
+              <a:rPr lang="en-US"/>
               <a:t>Second level</a:t>
             </a:r>
           </a:p>
           <a:p>
             <a:pPr lvl="2"/>
             <a:r>
-              <a:rPr lang="en-US" smtClean="0"/>
+              <a:rPr lang="en-US"/>
               <a:t>Third level</a:t>
             </a:r>
           </a:p>
           <a:p>
             <a:pPr lvl="3"/>
             <a:r>
-              <a:rPr lang="en-US" smtClean="0"/>
+              <a:rPr lang="en-US"/>
               <a:t>Fourth level</a:t>
             </a:r>
           </a:p>
           <a:p>
             <a:pPr lvl="4"/>
             <a:r>
-              <a:rPr lang="en-US" smtClean="0"/>
+              <a:rPr lang="en-US"/>
               <a:t>Fifth level</a:t>
             </a:r>
-            <a:endParaRPr lang="en-US"/>
           </a:p>
         </p:txBody>
       </p:sp>
@@ -1609,38 +1596,37 @@
           <a:p>
             <a:pPr lvl="0"/>
             <a:r>
-              <a:rPr lang="en-US" smtClean="0"/>
+              <a:rPr lang="en-US"/>
               <a:t>Click to edit Master text styles</a:t>
             </a:r>
           </a:p>
           <a:p>
             <a:pPr lvl="1"/>
             <a:r>
-              <a:rPr lang="en-US" smtClean="0"/>
+              <a:rPr lang="en-US"/>
               <a:t>Second level</a:t>
             </a:r>
           </a:p>
           <a:p>
             <a:pPr lvl="2"/>
             <a:r>
-              <a:rPr lang="en-US" smtClean="0"/>
+              <a:rPr lang="en-US"/>
               <a:t>Third level</a:t>
             </a:r>
           </a:p>
           <a:p>
             <a:pPr lvl="3"/>
             <a:r>
-              <a:rPr lang="en-US" smtClean="0"/>
+              <a:rPr lang="en-US"/>
               <a:t>Fourth level</a:t>
             </a:r>
           </a:p>
           <a:p>
             <a:pPr lvl="4"/>
             <a:r>
-              <a:rPr lang="en-US" smtClean="0"/>
+              <a:rPr lang="en-US"/>
               <a:t>Fifth level</a:t>
             </a:r>
-            <a:endParaRPr lang="en-US"/>
           </a:p>
         </p:txBody>
       </p:sp>
@@ -1661,7 +1647,7 @@
           <a:p>
             <a:fld id="{699DC775-C286-4358-8C92-D7E584E969B3}" type="datetimeFigureOut">
               <a:rPr lang="en-US" smtClean="0"/>
-              <a:t>30-Jun-15</a:t>
+              <a:t>1/23/2017</a:t>
             </a:fld>
             <a:endParaRPr lang="en-US"/>
           </a:p>
@@ -1759,10 +1745,9 @@
           </a:lstStyle>
           <a:p>
             <a:r>
-              <a:rPr lang="en-US" smtClean="0"/>
+              <a:rPr lang="en-US"/>
               <a:t>Click to edit Master title style</a:t>
             </a:r>
-            <a:endParaRPr lang="en-US"/>
           </a:p>
         </p:txBody>
       </p:sp>
@@ -1825,7 +1810,7 @@
           <a:p>
             <a:pPr lvl="0"/>
             <a:r>
-              <a:rPr lang="en-US" smtClean="0"/>
+              <a:rPr lang="en-US"/>
               <a:t>Click to edit Master text styles</a:t>
             </a:r>
           </a:p>
@@ -1881,38 +1866,37 @@
           <a:p>
             <a:pPr lvl="0"/>
             <a:r>
-              <a:rPr lang="en-US" smtClean="0"/>
+              <a:rPr lang="en-US"/>
               <a:t>Click to edit Master text styles</a:t>
             </a:r>
           </a:p>
           <a:p>
             <a:pPr lvl="1"/>
             <a:r>
-              <a:rPr lang="en-US" smtClean="0"/>
+              <a:rPr lang="en-US"/>
               <a:t>Second level</a:t>
             </a:r>
           </a:p>
           <a:p>
             <a:pPr lvl="2"/>
             <a:r>
-              <a:rPr lang="en-US" smtClean="0"/>
+              <a:rPr lang="en-US"/>
               <a:t>Third level</a:t>
             </a:r>
           </a:p>
           <a:p>
             <a:pPr lvl="3"/>
             <a:r>
-              <a:rPr lang="en-US" smtClean="0"/>
+              <a:rPr lang="en-US"/>
               <a:t>Fourth level</a:t>
             </a:r>
           </a:p>
           <a:p>
             <a:pPr lvl="4"/>
             <a:r>
-              <a:rPr lang="en-US" smtClean="0"/>
+              <a:rPr lang="en-US"/>
               <a:t>Fifth level</a:t>
             </a:r>
-            <a:endParaRPr lang="en-US"/>
           </a:p>
         </p:txBody>
       </p:sp>
@@ -1975,7 +1959,7 @@
           <a:p>
             <a:pPr lvl="0"/>
             <a:r>
-              <a:rPr lang="en-US" smtClean="0"/>
+              <a:rPr lang="en-US"/>
               <a:t>Click to edit Master text styles</a:t>
             </a:r>
           </a:p>
@@ -2031,38 +2015,37 @@
           <a:p>
             <a:pPr lvl="0"/>
             <a:r>
-              <a:rPr lang="en-US" smtClean="0"/>
+              <a:rPr lang="en-US"/>
               <a:t>Click to edit Master text styles</a:t>
             </a:r>
           </a:p>
           <a:p>
             <a:pPr lvl="1"/>
             <a:r>
-              <a:rPr lang="en-US" smtClean="0"/>
+              <a:rPr lang="en-US"/>
               <a:t>Second level</a:t>
             </a:r>
           </a:p>
           <a:p>
             <a:pPr lvl="2"/>
             <a:r>
-              <a:rPr lang="en-US" smtClean="0"/>
+              <a:rPr lang="en-US"/>
               <a:t>Third level</a:t>
             </a:r>
           </a:p>
           <a:p>
             <a:pPr lvl="3"/>
             <a:r>
-              <a:rPr lang="en-US" smtClean="0"/>
+              <a:rPr lang="en-US"/>
               <a:t>Fourth level</a:t>
             </a:r>
           </a:p>
           <a:p>
             <a:pPr lvl="4"/>
             <a:r>
-              <a:rPr lang="en-US" smtClean="0"/>
+              <a:rPr lang="en-US"/>
               <a:t>Fifth level</a:t>
             </a:r>
-            <a:endParaRPr lang="en-US"/>
           </a:p>
         </p:txBody>
       </p:sp>
@@ -2083,7 +2066,7 @@
           <a:p>
             <a:fld id="{699DC775-C286-4358-8C92-D7E584E969B3}" type="datetimeFigureOut">
               <a:rPr lang="en-US" smtClean="0"/>
-              <a:t>30-Jun-15</a:t>
+              <a:t>1/23/2017</a:t>
             </a:fld>
             <a:endParaRPr lang="en-US"/>
           </a:p>
@@ -2177,10 +2160,9 @@
           <a:lstStyle/>
           <a:p>
             <a:r>
-              <a:rPr lang="en-US" smtClean="0"/>
+              <a:rPr lang="en-US"/>
               <a:t>Click to edit Master title style</a:t>
             </a:r>
-            <a:endParaRPr lang="en-US"/>
           </a:p>
         </p:txBody>
       </p:sp>
@@ -2201,7 +2183,7 @@
           <a:p>
             <a:fld id="{699DC775-C286-4358-8C92-D7E584E969B3}" type="datetimeFigureOut">
               <a:rPr lang="en-US" smtClean="0"/>
-              <a:t>30-Jun-15</a:t>
+              <a:t>1/23/2017</a:t>
             </a:fld>
             <a:endParaRPr lang="en-US"/>
           </a:p>
@@ -2296,7 +2278,7 @@
           <a:p>
             <a:fld id="{699DC775-C286-4358-8C92-D7E584E969B3}" type="datetimeFigureOut">
               <a:rPr lang="en-US" smtClean="0"/>
-              <a:t>30-Jun-15</a:t>
+              <a:t>1/23/2017</a:t>
             </a:fld>
             <a:endParaRPr lang="en-US"/>
           </a:p>
@@ -2399,10 +2381,9 @@
           </a:lstStyle>
           <a:p>
             <a:r>
-              <a:rPr lang="en-US" smtClean="0"/>
+              <a:rPr lang="en-US"/>
               <a:t>Click to edit Master title style</a:t>
             </a:r>
-            <a:endParaRPr lang="en-US"/>
           </a:p>
         </p:txBody>
       </p:sp>
@@ -2456,38 +2437,37 @@
           <a:p>
             <a:pPr lvl="0"/>
             <a:r>
-              <a:rPr lang="en-US" smtClean="0"/>
+              <a:rPr lang="en-US"/>
               <a:t>Click to edit Master text styles</a:t>
             </a:r>
           </a:p>
           <a:p>
             <a:pPr lvl="1"/>
             <a:r>
-              <a:rPr lang="en-US" smtClean="0"/>
+              <a:rPr lang="en-US"/>
               <a:t>Second level</a:t>
             </a:r>
           </a:p>
           <a:p>
             <a:pPr lvl="2"/>
             <a:r>
-              <a:rPr lang="en-US" smtClean="0"/>
+              <a:rPr lang="en-US"/>
               <a:t>Third level</a:t>
             </a:r>
           </a:p>
           <a:p>
             <a:pPr lvl="3"/>
             <a:r>
-              <a:rPr lang="en-US" smtClean="0"/>
+              <a:rPr lang="en-US"/>
               <a:t>Fourth level</a:t>
             </a:r>
           </a:p>
           <a:p>
             <a:pPr lvl="4"/>
             <a:r>
-              <a:rPr lang="en-US" smtClean="0"/>
+              <a:rPr lang="en-US"/>
               <a:t>Fifth level</a:t>
             </a:r>
-            <a:endParaRPr lang="en-US"/>
           </a:p>
         </p:txBody>
       </p:sp>
@@ -2550,7 +2530,7 @@
           <a:p>
             <a:pPr lvl="0"/>
             <a:r>
-              <a:rPr lang="en-US" smtClean="0"/>
+              <a:rPr lang="en-US"/>
               <a:t>Click to edit Master text styles</a:t>
             </a:r>
           </a:p>
@@ -2573,7 +2553,7 @@
           <a:p>
             <a:fld id="{699DC775-C286-4358-8C92-D7E584E969B3}" type="datetimeFigureOut">
               <a:rPr lang="en-US" smtClean="0"/>
-              <a:t>30-Jun-15</a:t>
+              <a:t>1/23/2017</a:t>
             </a:fld>
             <a:endParaRPr lang="en-US"/>
           </a:p>
@@ -2667,10 +2647,9 @@
           <a:lstStyle/>
           <a:p>
             <a:r>
-              <a:rPr lang="en-US" smtClean="0"/>
+              <a:rPr lang="en-US"/>
               <a:t>Click to edit Master title style</a:t>
             </a:r>
-            <a:endParaRPr lang="en-US"/>
           </a:p>
         </p:txBody>
       </p:sp>
@@ -2691,38 +2670,37 @@
           <a:p>
             <a:pPr lvl="0"/>
             <a:r>
-              <a:rPr lang="en-US" smtClean="0"/>
+              <a:rPr lang="en-US"/>
               <a:t>Click to edit Master text styles</a:t>
             </a:r>
           </a:p>
           <a:p>
             <a:pPr lvl="1"/>
             <a:r>
-              <a:rPr lang="en-US" smtClean="0"/>
+              <a:rPr lang="en-US"/>
               <a:t>Second level</a:t>
             </a:r>
           </a:p>
           <a:p>
             <a:pPr lvl="2"/>
             <a:r>
-              <a:rPr lang="en-US" smtClean="0"/>
+              <a:rPr lang="en-US"/>
               <a:t>Third level</a:t>
             </a:r>
           </a:p>
           <a:p>
             <a:pPr lvl="3"/>
             <a:r>
-              <a:rPr lang="en-US" smtClean="0"/>
+              <a:rPr lang="en-US"/>
               <a:t>Fourth level</a:t>
             </a:r>
           </a:p>
           <a:p>
             <a:pPr lvl="4"/>
             <a:r>
-              <a:rPr lang="en-US" smtClean="0"/>
+              <a:rPr lang="en-US"/>
               <a:t>Fifth level</a:t>
             </a:r>
-            <a:endParaRPr lang="en-US"/>
           </a:p>
         </p:txBody>
       </p:sp>
@@ -2743,7 +2721,7 @@
           <a:p>
             <a:fld id="{699DC775-C286-4358-8C92-D7E584E969B3}" type="datetimeFigureOut">
               <a:rPr lang="en-US" smtClean="0"/>
-              <a:t>30-Jun-15</a:t>
+              <a:t>1/23/2017</a:t>
             </a:fld>
             <a:endParaRPr lang="en-US"/>
           </a:p>
@@ -2846,10 +2824,9 @@
           </a:lstStyle>
           <a:p>
             <a:r>
-              <a:rPr lang="en-US" smtClean="0"/>
+              <a:rPr lang="en-US"/>
               <a:t>Click to edit Master title style</a:t>
             </a:r>
-            <a:endParaRPr lang="en-US"/>
           </a:p>
         </p:txBody>
       </p:sp>
@@ -2973,7 +2950,7 @@
           <a:p>
             <a:pPr lvl="0"/>
             <a:r>
-              <a:rPr lang="en-US" smtClean="0"/>
+              <a:rPr lang="en-US"/>
               <a:t>Click to edit Master text styles</a:t>
             </a:r>
           </a:p>
@@ -2996,7 +2973,7 @@
           <a:p>
             <a:fld id="{699DC775-C286-4358-8C92-D7E584E969B3}" type="datetimeFigureOut">
               <a:rPr lang="en-US" smtClean="0"/>
-              <a:t>30-Jun-15</a:t>
+              <a:t>1/23/2017</a:t>
             </a:fld>
             <a:endParaRPr lang="en-US"/>
           </a:p>
@@ -3090,10 +3067,9 @@
           <a:lstStyle/>
           <a:p>
             <a:r>
-              <a:rPr lang="en-US" smtClean="0"/>
+              <a:rPr lang="en-US"/>
               <a:t>Click to edit Master title style</a:t>
             </a:r>
-            <a:endParaRPr lang="en-US"/>
           </a:p>
         </p:txBody>
       </p:sp>
@@ -3114,38 +3090,37 @@
           <a:p>
             <a:pPr lvl="0"/>
             <a:r>
-              <a:rPr lang="en-US" smtClean="0"/>
+              <a:rPr lang="en-US"/>
               <a:t>Click to edit Master text styles</a:t>
             </a:r>
           </a:p>
           <a:p>
             <a:pPr lvl="1"/>
             <a:r>
-              <a:rPr lang="en-US" smtClean="0"/>
+              <a:rPr lang="en-US"/>
               <a:t>Second level</a:t>
             </a:r>
           </a:p>
           <a:p>
             <a:pPr lvl="2"/>
             <a:r>
-              <a:rPr lang="en-US" smtClean="0"/>
+              <a:rPr lang="en-US"/>
               <a:t>Third level</a:t>
             </a:r>
           </a:p>
           <a:p>
             <a:pPr lvl="3"/>
             <a:r>
-              <a:rPr lang="en-US" smtClean="0"/>
+              <a:rPr lang="en-US"/>
               <a:t>Fourth level</a:t>
             </a:r>
           </a:p>
           <a:p>
             <a:pPr lvl="4"/>
             <a:r>
-              <a:rPr lang="en-US" smtClean="0"/>
+              <a:rPr lang="en-US"/>
               <a:t>Fifth level</a:t>
             </a:r>
-            <a:endParaRPr lang="en-US"/>
           </a:p>
         </p:txBody>
       </p:sp>
@@ -3166,7 +3141,7 @@
           <a:p>
             <a:fld id="{699DC775-C286-4358-8C92-D7E584E969B3}" type="datetimeFigureOut">
               <a:rPr lang="en-US" smtClean="0"/>
-              <a:t>30-Jun-15</a:t>
+              <a:t>1/23/2017</a:t>
             </a:fld>
             <a:endParaRPr lang="en-US"/>
           </a:p>
@@ -3265,10 +3240,9 @@
           <a:lstStyle/>
           <a:p>
             <a:r>
-              <a:rPr lang="en-US" smtClean="0"/>
+              <a:rPr lang="en-US"/>
               <a:t>Click to edit Master title style</a:t>
             </a:r>
-            <a:endParaRPr lang="en-US"/>
           </a:p>
         </p:txBody>
       </p:sp>
@@ -3294,38 +3268,37 @@
           <a:p>
             <a:pPr lvl="0"/>
             <a:r>
-              <a:rPr lang="en-US" smtClean="0"/>
+              <a:rPr lang="en-US"/>
               <a:t>Click to edit Master text styles</a:t>
             </a:r>
           </a:p>
           <a:p>
             <a:pPr lvl="1"/>
             <a:r>
-              <a:rPr lang="en-US" smtClean="0"/>
+              <a:rPr lang="en-US"/>
               <a:t>Second level</a:t>
             </a:r>
           </a:p>
           <a:p>
             <a:pPr lvl="2"/>
             <a:r>
-              <a:rPr lang="en-US" smtClean="0"/>
+              <a:rPr lang="en-US"/>
               <a:t>Third level</a:t>
             </a:r>
           </a:p>
           <a:p>
             <a:pPr lvl="3"/>
             <a:r>
-              <a:rPr lang="en-US" smtClean="0"/>
+              <a:rPr lang="en-US"/>
               <a:t>Fourth level</a:t>
             </a:r>
           </a:p>
           <a:p>
             <a:pPr lvl="4"/>
             <a:r>
-              <a:rPr lang="en-US" smtClean="0"/>
+              <a:rPr lang="en-US"/>
               <a:t>Fifth level</a:t>
             </a:r>
-            <a:endParaRPr lang="en-US"/>
           </a:p>
         </p:txBody>
       </p:sp>
@@ -3346,7 +3319,7 @@
           <a:p>
             <a:fld id="{699DC775-C286-4358-8C92-D7E584E969B3}" type="datetimeFigureOut">
               <a:rPr lang="en-US" smtClean="0"/>
-              <a:t>30-Jun-15</a:t>
+              <a:t>1/23/2017</a:t>
             </a:fld>
             <a:endParaRPr lang="en-US"/>
           </a:p>
@@ -3453,10 +3426,9 @@
           <a:lstStyle/>
           <a:p>
             <a:r>
-              <a:rPr lang="en-US" smtClean="0"/>
+              <a:rPr lang="en-US"/>
               <a:t>Click to edit Master title style</a:t>
             </a:r>
-            <a:endParaRPr lang="en-US"/>
           </a:p>
         </p:txBody>
       </p:sp>
@@ -3572,10 +3544,9 @@
           </a:lstStyle>
           <a:p>
             <a:r>
-              <a:rPr lang="en-US" smtClean="0"/>
+              <a:rPr lang="en-US"/>
               <a:t>Click to edit Master subtitle style</a:t>
             </a:r>
-            <a:endParaRPr lang="en-US"/>
           </a:p>
         </p:txBody>
       </p:sp>
@@ -3596,7 +3567,7 @@
           <a:p>
             <a:fld id="{699DC775-C286-4358-8C92-D7E584E969B3}" type="datetimeFigureOut">
               <a:rPr lang="en-US" smtClean="0"/>
-              <a:t>30-Jun-15</a:t>
+              <a:t>1/23/2017</a:t>
             </a:fld>
             <a:endParaRPr lang="en-US"/>
           </a:p>
@@ -3698,10 +3669,9 @@
           <a:lstStyle/>
           <a:p>
             <a:r>
-              <a:rPr lang="en-US" smtClean="0"/>
+              <a:rPr lang="en-US"/>
               <a:t>Click to edit Master title style</a:t>
             </a:r>
-            <a:endParaRPr lang="en-US"/>
           </a:p>
         </p:txBody>
       </p:sp>
@@ -3722,38 +3692,37 @@
           <a:p>
             <a:pPr lvl="0"/>
             <a:r>
-              <a:rPr lang="en-US" smtClean="0"/>
+              <a:rPr lang="en-US"/>
               <a:t>Click to edit Master text styles</a:t>
             </a:r>
           </a:p>
           <a:p>
             <a:pPr lvl="1"/>
             <a:r>
-              <a:rPr lang="en-US" smtClean="0"/>
+              <a:rPr lang="en-US"/>
               <a:t>Second level</a:t>
             </a:r>
           </a:p>
           <a:p>
             <a:pPr lvl="2"/>
             <a:r>
-              <a:rPr lang="en-US" smtClean="0"/>
+              <a:rPr lang="en-US"/>
               <a:t>Third level</a:t>
             </a:r>
           </a:p>
           <a:p>
             <a:pPr lvl="3"/>
             <a:r>
-              <a:rPr lang="en-US" smtClean="0"/>
+              <a:rPr lang="en-US"/>
               <a:t>Fourth level</a:t>
             </a:r>
           </a:p>
           <a:p>
             <a:pPr lvl="4"/>
             <a:r>
-              <a:rPr lang="en-US" smtClean="0"/>
+              <a:rPr lang="en-US"/>
               <a:t>Fifth level</a:t>
             </a:r>
-            <a:endParaRPr lang="en-US"/>
           </a:p>
         </p:txBody>
       </p:sp>
@@ -3774,7 +3743,7 @@
           <a:p>
             <a:fld id="{699DC775-C286-4358-8C92-D7E584E969B3}" type="datetimeFigureOut">
               <a:rPr lang="en-US" smtClean="0"/>
-              <a:t>30-Jun-15</a:t>
+              <a:t>1/23/2017</a:t>
             </a:fld>
             <a:endParaRPr lang="en-US"/>
           </a:p>
@@ -3885,10 +3854,9 @@
           </a:lstStyle>
           <a:p>
             <a:r>
-              <a:rPr lang="en-US" smtClean="0"/>
+              <a:rPr lang="en-US"/>
               <a:t>Click to edit Master title style</a:t>
             </a:r>
-            <a:endParaRPr lang="en-US"/>
           </a:p>
         </p:txBody>
       </p:sp>
@@ -4005,7 +3973,7 @@
           <a:p>
             <a:pPr lvl="0"/>
             <a:r>
-              <a:rPr lang="en-US" smtClean="0"/>
+              <a:rPr lang="en-US"/>
               <a:t>Click to edit Master text styles</a:t>
             </a:r>
           </a:p>
@@ -4028,7 +3996,7 @@
           <a:p>
             <a:fld id="{699DC775-C286-4358-8C92-D7E584E969B3}" type="datetimeFigureOut">
               <a:rPr lang="en-US" smtClean="0"/>
-              <a:t>30-Jun-15</a:t>
+              <a:t>1/23/2017</a:t>
             </a:fld>
             <a:endParaRPr lang="en-US"/>
           </a:p>
@@ -4130,10 +4098,9 @@
           <a:lstStyle/>
           <a:p>
             <a:r>
-              <a:rPr lang="en-US" smtClean="0"/>
+              <a:rPr lang="en-US"/>
               <a:t>Click to edit Master title style</a:t>
             </a:r>
-            <a:endParaRPr lang="en-US"/>
           </a:p>
         </p:txBody>
       </p:sp>
@@ -4187,38 +4154,37 @@
           <a:p>
             <a:pPr lvl="0"/>
             <a:r>
-              <a:rPr lang="en-US" smtClean="0"/>
+              <a:rPr lang="en-US"/>
               <a:t>Click to edit Master text styles</a:t>
             </a:r>
           </a:p>
           <a:p>
             <a:pPr lvl="1"/>
             <a:r>
-              <a:rPr lang="en-US" smtClean="0"/>
+              <a:rPr lang="en-US"/>
               <a:t>Second level</a:t>
             </a:r>
           </a:p>
           <a:p>
             <a:pPr lvl="2"/>
             <a:r>
-              <a:rPr lang="en-US" smtClean="0"/>
+              <a:rPr lang="en-US"/>
               <a:t>Third level</a:t>
             </a:r>
           </a:p>
           <a:p>
             <a:pPr lvl="3"/>
             <a:r>
-              <a:rPr lang="en-US" smtClean="0"/>
+              <a:rPr lang="en-US"/>
               <a:t>Fourth level</a:t>
             </a:r>
           </a:p>
           <a:p>
             <a:pPr lvl="4"/>
             <a:r>
-              <a:rPr lang="en-US" smtClean="0"/>
+              <a:rPr lang="en-US"/>
               <a:t>Fifth level</a:t>
             </a:r>
-            <a:endParaRPr lang="en-US"/>
           </a:p>
         </p:txBody>
       </p:sp>
@@ -4272,38 +4238,37 @@
           <a:p>
             <a:pPr lvl="0"/>
             <a:r>
-              <a:rPr lang="en-US" smtClean="0"/>
+              <a:rPr lang="en-US"/>
               <a:t>Click to edit Master text styles</a:t>
             </a:r>
           </a:p>
           <a:p>
             <a:pPr lvl="1"/>
             <a:r>
-              <a:rPr lang="en-US" smtClean="0"/>
+              <a:rPr lang="en-US"/>
               <a:t>Second level</a:t>
             </a:r>
           </a:p>
           <a:p>
             <a:pPr lvl="2"/>
             <a:r>
-              <a:rPr lang="en-US" smtClean="0"/>
+              <a:rPr lang="en-US"/>
               <a:t>Third level</a:t>
             </a:r>
           </a:p>
           <a:p>
             <a:pPr lvl="3"/>
             <a:r>
-              <a:rPr lang="en-US" smtClean="0"/>
+              <a:rPr lang="en-US"/>
               <a:t>Fourth level</a:t>
             </a:r>
           </a:p>
           <a:p>
             <a:pPr lvl="4"/>
             <a:r>
-              <a:rPr lang="en-US" smtClean="0"/>
+              <a:rPr lang="en-US"/>
               <a:t>Fifth level</a:t>
             </a:r>
-            <a:endParaRPr lang="en-US"/>
           </a:p>
         </p:txBody>
       </p:sp>
@@ -4324,7 +4289,7 @@
           <a:p>
             <a:fld id="{699DC775-C286-4358-8C92-D7E584E969B3}" type="datetimeFigureOut">
               <a:rPr lang="en-US" smtClean="0"/>
-              <a:t>30-Jun-15</a:t>
+              <a:t>1/23/2017</a:t>
             </a:fld>
             <a:endParaRPr lang="en-US"/>
           </a:p>
@@ -4430,10 +4395,9 @@
           </a:lstStyle>
           <a:p>
             <a:r>
-              <a:rPr lang="en-US" smtClean="0"/>
+              <a:rPr lang="en-US"/>
               <a:t>Click to edit Master title style</a:t>
             </a:r>
-            <a:endParaRPr lang="en-US"/>
           </a:p>
         </p:txBody>
       </p:sp>
@@ -4496,7 +4460,7 @@
           <a:p>
             <a:pPr lvl="0"/>
             <a:r>
-              <a:rPr lang="en-US" smtClean="0"/>
+              <a:rPr lang="en-US"/>
               <a:t>Click to edit Master text styles</a:t>
             </a:r>
           </a:p>
@@ -4552,38 +4516,37 @@
           <a:p>
             <a:pPr lvl="0"/>
             <a:r>
-              <a:rPr lang="en-US" smtClean="0"/>
+              <a:rPr lang="en-US"/>
               <a:t>Click to edit Master text styles</a:t>
             </a:r>
           </a:p>
           <a:p>
             <a:pPr lvl="1"/>
             <a:r>
-              <a:rPr lang="en-US" smtClean="0"/>
+              <a:rPr lang="en-US"/>
               <a:t>Second level</a:t>
             </a:r>
           </a:p>
           <a:p>
             <a:pPr lvl="2"/>
             <a:r>
-              <a:rPr lang="en-US" smtClean="0"/>
+              <a:rPr lang="en-US"/>
               <a:t>Third level</a:t>
             </a:r>
           </a:p>
           <a:p>
             <a:pPr lvl="3"/>
             <a:r>
-              <a:rPr lang="en-US" smtClean="0"/>
+              <a:rPr lang="en-US"/>
               <a:t>Fourth level</a:t>
             </a:r>
           </a:p>
           <a:p>
             <a:pPr lvl="4"/>
             <a:r>
-              <a:rPr lang="en-US" smtClean="0"/>
+              <a:rPr lang="en-US"/>
               <a:t>Fifth level</a:t>
             </a:r>
-            <a:endParaRPr lang="en-US"/>
           </a:p>
         </p:txBody>
       </p:sp>
@@ -4646,7 +4609,7 @@
           <a:p>
             <a:pPr lvl="0"/>
             <a:r>
-              <a:rPr lang="en-US" smtClean="0"/>
+              <a:rPr lang="en-US"/>
               <a:t>Click to edit Master text styles</a:t>
             </a:r>
           </a:p>
@@ -4702,38 +4665,37 @@
           <a:p>
             <a:pPr lvl="0"/>
             <a:r>
-              <a:rPr lang="en-US" smtClean="0"/>
+              <a:rPr lang="en-US"/>
               <a:t>Click to edit Master text styles</a:t>
             </a:r>
           </a:p>
           <a:p>
             <a:pPr lvl="1"/>
             <a:r>
-              <a:rPr lang="en-US" smtClean="0"/>
+              <a:rPr lang="en-US"/>
               <a:t>Second level</a:t>
             </a:r>
           </a:p>
           <a:p>
             <a:pPr lvl="2"/>
             <a:r>
-              <a:rPr lang="en-US" smtClean="0"/>
+              <a:rPr lang="en-US"/>
               <a:t>Third level</a:t>
             </a:r>
           </a:p>
           <a:p>
             <a:pPr lvl="3"/>
             <a:r>
-              <a:rPr lang="en-US" smtClean="0"/>
+              <a:rPr lang="en-US"/>
               <a:t>Fourth level</a:t>
             </a:r>
           </a:p>
           <a:p>
             <a:pPr lvl="4"/>
             <a:r>
-              <a:rPr lang="en-US" smtClean="0"/>
+              <a:rPr lang="en-US"/>
               <a:t>Fifth level</a:t>
             </a:r>
-            <a:endParaRPr lang="en-US"/>
           </a:p>
         </p:txBody>
       </p:sp>
@@ -4754,7 +4716,7 @@
           <a:p>
             <a:fld id="{699DC775-C286-4358-8C92-D7E584E969B3}" type="datetimeFigureOut">
               <a:rPr lang="en-US" smtClean="0"/>
-              <a:t>30-Jun-15</a:t>
+              <a:t>1/23/2017</a:t>
             </a:fld>
             <a:endParaRPr lang="en-US"/>
           </a:p>
@@ -4856,10 +4818,9 @@
           <a:lstStyle/>
           <a:p>
             <a:r>
-              <a:rPr lang="en-US" smtClean="0"/>
+              <a:rPr lang="en-US"/>
               <a:t>Click to edit Master title style</a:t>
             </a:r>
-            <a:endParaRPr lang="en-US"/>
           </a:p>
         </p:txBody>
       </p:sp>
@@ -4880,7 +4841,7 @@
           <a:p>
             <a:fld id="{699DC775-C286-4358-8C92-D7E584E969B3}" type="datetimeFigureOut">
               <a:rPr lang="en-US" smtClean="0"/>
-              <a:t>30-Jun-15</a:t>
+              <a:t>1/23/2017</a:t>
             </a:fld>
             <a:endParaRPr lang="en-US"/>
           </a:p>
@@ -4983,7 +4944,7 @@
           <a:p>
             <a:fld id="{699DC775-C286-4358-8C92-D7E584E969B3}" type="datetimeFigureOut">
               <a:rPr lang="en-US" smtClean="0"/>
-              <a:t>30-Jun-15</a:t>
+              <a:t>1/23/2017</a:t>
             </a:fld>
             <a:endParaRPr lang="en-US"/>
           </a:p>
@@ -5086,10 +5047,9 @@
           </a:lstStyle>
           <a:p>
             <a:r>
-              <a:rPr lang="en-US" smtClean="0"/>
+              <a:rPr lang="en-US"/>
               <a:t>Click to edit Master title style</a:t>
             </a:r>
-            <a:endParaRPr lang="en-US"/>
           </a:p>
         </p:txBody>
       </p:sp>
@@ -5206,7 +5166,7 @@
           <a:p>
             <a:pPr lvl="0"/>
             <a:r>
-              <a:rPr lang="en-US" smtClean="0"/>
+              <a:rPr lang="en-US"/>
               <a:t>Click to edit Master text styles</a:t>
             </a:r>
           </a:p>
@@ -5229,7 +5189,7 @@
           <a:p>
             <a:fld id="{699DC775-C286-4358-8C92-D7E584E969B3}" type="datetimeFigureOut">
               <a:rPr lang="en-US" smtClean="0"/>
-              <a:t>30-Jun-15</a:t>
+              <a:t>1/23/2017</a:t>
             </a:fld>
             <a:endParaRPr lang="en-US"/>
           </a:p>
@@ -5340,10 +5300,9 @@
           </a:lstStyle>
           <a:p>
             <a:r>
-              <a:rPr lang="en-US" smtClean="0"/>
+              <a:rPr lang="en-US"/>
               <a:t>Click to edit Master title style</a:t>
             </a:r>
-            <a:endParaRPr lang="en-US"/>
           </a:p>
         </p:txBody>
       </p:sp>
@@ -5397,38 +5356,37 @@
           <a:p>
             <a:pPr lvl="0"/>
             <a:r>
-              <a:rPr lang="en-US" smtClean="0"/>
+              <a:rPr lang="en-US"/>
               <a:t>Click to edit Master text styles</a:t>
             </a:r>
           </a:p>
           <a:p>
             <a:pPr lvl="1"/>
             <a:r>
-              <a:rPr lang="en-US" smtClean="0"/>
+              <a:rPr lang="en-US"/>
               <a:t>Second level</a:t>
             </a:r>
           </a:p>
           <a:p>
             <a:pPr lvl="2"/>
             <a:r>
-              <a:rPr lang="en-US" smtClean="0"/>
+              <a:rPr lang="en-US"/>
               <a:t>Third level</a:t>
             </a:r>
           </a:p>
           <a:p>
             <a:pPr lvl="3"/>
             <a:r>
-              <a:rPr lang="en-US" smtClean="0"/>
+              <a:rPr lang="en-US"/>
               <a:t>Fourth level</a:t>
             </a:r>
           </a:p>
           <a:p>
             <a:pPr lvl="4"/>
             <a:r>
-              <a:rPr lang="en-US" smtClean="0"/>
+              <a:rPr lang="en-US"/>
               <a:t>Fifth level</a:t>
             </a:r>
-            <a:endParaRPr lang="en-US"/>
           </a:p>
         </p:txBody>
       </p:sp>
@@ -5491,7 +5449,7 @@
           <a:p>
             <a:pPr lvl="0"/>
             <a:r>
-              <a:rPr lang="en-US" smtClean="0"/>
+              <a:rPr lang="en-US"/>
               <a:t>Click to edit Master text styles</a:t>
             </a:r>
           </a:p>
@@ -5514,7 +5472,7 @@
           <a:p>
             <a:fld id="{699DC775-C286-4358-8C92-D7E584E969B3}" type="datetimeFigureOut">
               <a:rPr lang="en-US" smtClean="0"/>
-              <a:t>30-Jun-15</a:t>
+              <a:t>1/23/2017</a:t>
             </a:fld>
             <a:endParaRPr lang="en-US"/>
           </a:p>
@@ -5625,10 +5583,9 @@
           </a:lstStyle>
           <a:p>
             <a:r>
-              <a:rPr lang="en-US" smtClean="0"/>
+              <a:rPr lang="en-US"/>
               <a:t>Click to edit Master title style</a:t>
             </a:r>
-            <a:endParaRPr lang="en-US"/>
           </a:p>
         </p:txBody>
       </p:sp>
@@ -5752,7 +5709,7 @@
           <a:p>
             <a:pPr lvl="0"/>
             <a:r>
-              <a:rPr lang="en-US" smtClean="0"/>
+              <a:rPr lang="en-US"/>
               <a:t>Click to edit Master text styles</a:t>
             </a:r>
           </a:p>
@@ -5775,7 +5732,7 @@
           <a:p>
             <a:fld id="{699DC775-C286-4358-8C92-D7E584E969B3}" type="datetimeFigureOut">
               <a:rPr lang="en-US" smtClean="0"/>
-              <a:t>30-Jun-15</a:t>
+              <a:t>1/23/2017</a:t>
             </a:fld>
             <a:endParaRPr lang="en-US"/>
           </a:p>
@@ -5877,10 +5834,9 @@
           <a:lstStyle/>
           <a:p>
             <a:r>
-              <a:rPr lang="en-US" smtClean="0"/>
+              <a:rPr lang="en-US"/>
               <a:t>Click to edit Master title style</a:t>
             </a:r>
-            <a:endParaRPr lang="en-US"/>
           </a:p>
         </p:txBody>
       </p:sp>
@@ -5901,38 +5857,37 @@
           <a:p>
             <a:pPr lvl="0"/>
             <a:r>
-              <a:rPr lang="en-US" smtClean="0"/>
+              <a:rPr lang="en-US"/>
               <a:t>Click to edit Master text styles</a:t>
             </a:r>
           </a:p>
           <a:p>
             <a:pPr lvl="1"/>
             <a:r>
-              <a:rPr lang="en-US" smtClean="0"/>
+              <a:rPr lang="en-US"/>
               <a:t>Second level</a:t>
             </a:r>
           </a:p>
           <a:p>
             <a:pPr lvl="2"/>
             <a:r>
-              <a:rPr lang="en-US" smtClean="0"/>
+              <a:rPr lang="en-US"/>
               <a:t>Third level</a:t>
             </a:r>
           </a:p>
           <a:p>
             <a:pPr lvl="3"/>
             <a:r>
-              <a:rPr lang="en-US" smtClean="0"/>
+              <a:rPr lang="en-US"/>
               <a:t>Fourth level</a:t>
             </a:r>
           </a:p>
           <a:p>
             <a:pPr lvl="4"/>
             <a:r>
-              <a:rPr lang="en-US" smtClean="0"/>
+              <a:rPr lang="en-US"/>
               <a:t>Fifth level</a:t>
             </a:r>
-            <a:endParaRPr lang="en-US"/>
           </a:p>
         </p:txBody>
       </p:sp>
@@ -5953,7 +5908,7 @@
           <a:p>
             <a:fld id="{699DC775-C286-4358-8C92-D7E584E969B3}" type="datetimeFigureOut">
               <a:rPr lang="en-US" smtClean="0"/>
-              <a:t>30-Jun-15</a:t>
+              <a:t>1/23/2017</a:t>
             </a:fld>
             <a:endParaRPr lang="en-US"/>
           </a:p>
@@ -6060,10 +6015,9 @@
           <a:lstStyle/>
           <a:p>
             <a:r>
-              <a:rPr lang="en-US" smtClean="0"/>
+              <a:rPr lang="en-US"/>
               <a:t>Click to edit Master title style</a:t>
             </a:r>
-            <a:endParaRPr lang="en-US"/>
           </a:p>
         </p:txBody>
       </p:sp>
@@ -6089,38 +6043,37 @@
           <a:p>
             <a:pPr lvl="0"/>
             <a:r>
-              <a:rPr lang="en-US" smtClean="0"/>
+              <a:rPr lang="en-US"/>
               <a:t>Click to edit Master text styles</a:t>
             </a:r>
           </a:p>
           <a:p>
             <a:pPr lvl="1"/>
             <a:r>
-              <a:rPr lang="en-US" smtClean="0"/>
+              <a:rPr lang="en-US"/>
               <a:t>Second level</a:t>
             </a:r>
           </a:p>
           <a:p>
             <a:pPr lvl="2"/>
             <a:r>
-              <a:rPr lang="en-US" smtClean="0"/>
+              <a:rPr lang="en-US"/>
               <a:t>Third level</a:t>
             </a:r>
           </a:p>
           <a:p>
             <a:pPr lvl="3"/>
             <a:r>
-              <a:rPr lang="en-US" smtClean="0"/>
+              <a:rPr lang="en-US"/>
               <a:t>Fourth level</a:t>
             </a:r>
           </a:p>
           <a:p>
             <a:pPr lvl="4"/>
             <a:r>
-              <a:rPr lang="en-US" smtClean="0"/>
+              <a:rPr lang="en-US"/>
               <a:t>Fifth level</a:t>
             </a:r>
-            <a:endParaRPr lang="en-US"/>
           </a:p>
         </p:txBody>
       </p:sp>
@@ -6141,7 +6094,7 @@
           <a:p>
             <a:fld id="{699DC775-C286-4358-8C92-D7E584E969B3}" type="datetimeFigureOut">
               <a:rPr lang="en-US" smtClean="0"/>
-              <a:t>30-Jun-15</a:t>
+              <a:t>1/23/2017</a:t>
             </a:fld>
             <a:endParaRPr lang="en-US"/>
           </a:p>
@@ -6235,10 +6188,9 @@
           <a:lstStyle/>
           <a:p>
             <a:r>
-              <a:rPr lang="en-US" smtClean="0"/>
+              <a:rPr lang="en-US"/>
               <a:t>Click to edit Master title style</a:t>
             </a:r>
-            <a:endParaRPr lang="en-US"/>
           </a:p>
         </p:txBody>
       </p:sp>
@@ -6292,38 +6244,37 @@
           <a:p>
             <a:pPr lvl="0"/>
             <a:r>
-              <a:rPr lang="en-US" smtClean="0"/>
+              <a:rPr lang="en-US"/>
               <a:t>Click to edit Master text styles</a:t>
             </a:r>
           </a:p>
           <a:p>
             <a:pPr lvl="1"/>
             <a:r>
-              <a:rPr lang="en-US" smtClean="0"/>
+              <a:rPr lang="en-US"/>
               <a:t>Second level</a:t>
             </a:r>
           </a:p>
           <a:p>
             <a:pPr lvl="2"/>
             <a:r>
-              <a:rPr lang="en-US" smtClean="0"/>
+              <a:rPr lang="en-US"/>
               <a:t>Third level</a:t>
             </a:r>
           </a:p>
           <a:p>
             <a:pPr lvl="3"/>
             <a:r>
-              <a:rPr lang="en-US" smtClean="0"/>
+              <a:rPr lang="en-US"/>
               <a:t>Fourth level</a:t>
             </a:r>
           </a:p>
           <a:p>
             <a:pPr lvl="4"/>
             <a:r>
-              <a:rPr lang="en-US" smtClean="0"/>
+              <a:rPr lang="en-US"/>
               <a:t>Fifth level</a:t>
             </a:r>
-            <a:endParaRPr lang="en-US"/>
           </a:p>
         </p:txBody>
       </p:sp>
@@ -6377,38 +6328,37 @@
           <a:p>
             <a:pPr lvl="0"/>
             <a:r>
-              <a:rPr lang="en-US" smtClean="0"/>
+              <a:rPr lang="en-US"/>
               <a:t>Click to edit Master text styles</a:t>
             </a:r>
           </a:p>
           <a:p>
             <a:pPr lvl="1"/>
             <a:r>
-              <a:rPr lang="en-US" smtClean="0"/>
+              <a:rPr lang="en-US"/>
               <a:t>Second level</a:t>
             </a:r>
           </a:p>
           <a:p>
             <a:pPr lvl="2"/>
             <a:r>
-              <a:rPr lang="en-US" smtClean="0"/>
+              <a:rPr lang="en-US"/>
               <a:t>Third level</a:t>
             </a:r>
           </a:p>
           <a:p>
             <a:pPr lvl="3"/>
             <a:r>
-              <a:rPr lang="en-US" smtClean="0"/>
+              <a:rPr lang="en-US"/>
               <a:t>Fourth level</a:t>
             </a:r>
           </a:p>
           <a:p>
             <a:pPr lvl="4"/>
             <a:r>
-              <a:rPr lang="en-US" smtClean="0"/>
+              <a:rPr lang="en-US"/>
               <a:t>Fifth level</a:t>
             </a:r>
-            <a:endParaRPr lang="en-US"/>
           </a:p>
         </p:txBody>
       </p:sp>
@@ -6429,7 +6379,7 @@
           <a:p>
             <a:fld id="{699DC775-C286-4358-8C92-D7E584E969B3}" type="datetimeFigureOut">
               <a:rPr lang="en-US" smtClean="0"/>
-              <a:t>30-Jun-15</a:t>
+              <a:t>1/23/2017</a:t>
             </a:fld>
             <a:endParaRPr lang="en-US"/>
           </a:p>
@@ -6527,10 +6477,9 @@
           </a:lstStyle>
           <a:p>
             <a:r>
-              <a:rPr lang="en-US" smtClean="0"/>
+              <a:rPr lang="en-US"/>
               <a:t>Click to edit Master title style</a:t>
             </a:r>
-            <a:endParaRPr lang="en-US"/>
           </a:p>
         </p:txBody>
       </p:sp>
@@ -6593,7 +6542,7 @@
           <a:p>
             <a:pPr lvl="0"/>
             <a:r>
-              <a:rPr lang="en-US" smtClean="0"/>
+              <a:rPr lang="en-US"/>
               <a:t>Click to edit Master text styles</a:t>
             </a:r>
           </a:p>
@@ -6649,38 +6598,37 @@
           <a:p>
             <a:pPr lvl="0"/>
             <a:r>
-              <a:rPr lang="en-US" smtClean="0"/>
+              <a:rPr lang="en-US"/>
               <a:t>Click to edit Master text styles</a:t>
             </a:r>
           </a:p>
           <a:p>
             <a:pPr lvl="1"/>
             <a:r>
-              <a:rPr lang="en-US" smtClean="0"/>
+              <a:rPr lang="en-US"/>
               <a:t>Second level</a:t>
             </a:r>
           </a:p>
           <a:p>
             <a:pPr lvl="2"/>
             <a:r>
-              <a:rPr lang="en-US" smtClean="0"/>
+              <a:rPr lang="en-US"/>
               <a:t>Third level</a:t>
             </a:r>
           </a:p>
           <a:p>
             <a:pPr lvl="3"/>
             <a:r>
-              <a:rPr lang="en-US" smtClean="0"/>
+              <a:rPr lang="en-US"/>
               <a:t>Fourth level</a:t>
             </a:r>
           </a:p>
           <a:p>
             <a:pPr lvl="4"/>
             <a:r>
-              <a:rPr lang="en-US" smtClean="0"/>
+              <a:rPr lang="en-US"/>
               <a:t>Fifth level</a:t>
             </a:r>
-            <a:endParaRPr lang="en-US"/>
           </a:p>
         </p:txBody>
       </p:sp>
@@ -6743,7 +6691,7 @@
           <a:p>
             <a:pPr lvl="0"/>
             <a:r>
-              <a:rPr lang="en-US" smtClean="0"/>
+              <a:rPr lang="en-US"/>
               <a:t>Click to edit Master text styles</a:t>
             </a:r>
           </a:p>
@@ -6799,38 +6747,37 @@
           <a:p>
             <a:pPr lvl="0"/>
             <a:r>
-              <a:rPr lang="en-US" smtClean="0"/>
+              <a:rPr lang="en-US"/>
               <a:t>Click to edit Master text styles</a:t>
             </a:r>
           </a:p>
           <a:p>
             <a:pPr lvl="1"/>
             <a:r>
-              <a:rPr lang="en-US" smtClean="0"/>
+              <a:rPr lang="en-US"/>
               <a:t>Second level</a:t>
             </a:r>
           </a:p>
           <a:p>
             <a:pPr lvl="2"/>
             <a:r>
-              <a:rPr lang="en-US" smtClean="0"/>
+              <a:rPr lang="en-US"/>
               <a:t>Third level</a:t>
             </a:r>
           </a:p>
           <a:p>
             <a:pPr lvl="3"/>
             <a:r>
-              <a:rPr lang="en-US" smtClean="0"/>
+              <a:rPr lang="en-US"/>
               <a:t>Fourth level</a:t>
             </a:r>
           </a:p>
           <a:p>
             <a:pPr lvl="4"/>
             <a:r>
-              <a:rPr lang="en-US" smtClean="0"/>
+              <a:rPr lang="en-US"/>
               <a:t>Fifth level</a:t>
             </a:r>
-            <a:endParaRPr lang="en-US"/>
           </a:p>
         </p:txBody>
       </p:sp>
@@ -6851,7 +6798,7 @@
           <a:p>
             <a:fld id="{699DC775-C286-4358-8C92-D7E584E969B3}" type="datetimeFigureOut">
               <a:rPr lang="en-US" smtClean="0"/>
-              <a:t>30-Jun-15</a:t>
+              <a:t>1/23/2017</a:t>
             </a:fld>
             <a:endParaRPr lang="en-US"/>
           </a:p>
@@ -6945,10 +6892,9 @@
           <a:lstStyle/>
           <a:p>
             <a:r>
-              <a:rPr lang="en-US" smtClean="0"/>
+              <a:rPr lang="en-US"/>
               <a:t>Click to edit Master title style</a:t>
             </a:r>
-            <a:endParaRPr lang="en-US"/>
           </a:p>
         </p:txBody>
       </p:sp>
@@ -6969,7 +6915,7 @@
           <a:p>
             <a:fld id="{699DC775-C286-4358-8C92-D7E584E969B3}" type="datetimeFigureOut">
               <a:rPr lang="en-US" smtClean="0"/>
-              <a:t>30-Jun-15</a:t>
+              <a:t>1/23/2017</a:t>
             </a:fld>
             <a:endParaRPr lang="en-US"/>
           </a:p>
@@ -7064,7 +7010,7 @@
           <a:p>
             <a:fld id="{699DC775-C286-4358-8C92-D7E584E969B3}" type="datetimeFigureOut">
               <a:rPr lang="en-US" smtClean="0"/>
-              <a:t>30-Jun-15</a:t>
+              <a:t>1/23/2017</a:t>
             </a:fld>
             <a:endParaRPr lang="en-US"/>
           </a:p>
@@ -7167,10 +7113,9 @@
           </a:lstStyle>
           <a:p>
             <a:r>
-              <a:rPr lang="en-US" smtClean="0"/>
+              <a:rPr lang="en-US"/>
               <a:t>Click to edit Master title style</a:t>
             </a:r>
-            <a:endParaRPr lang="en-US"/>
           </a:p>
         </p:txBody>
       </p:sp>
@@ -7224,38 +7169,37 @@
           <a:p>
             <a:pPr lvl="0"/>
             <a:r>
-              <a:rPr lang="en-US" smtClean="0"/>
+              <a:rPr lang="en-US"/>
               <a:t>Click to edit Master text styles</a:t>
             </a:r>
           </a:p>
           <a:p>
             <a:pPr lvl="1"/>
             <a:r>
-              <a:rPr lang="en-US" smtClean="0"/>
+              <a:rPr lang="en-US"/>
               <a:t>Second level</a:t>
             </a:r>
           </a:p>
           <a:p>
             <a:pPr lvl="2"/>
             <a:r>
-              <a:rPr lang="en-US" smtClean="0"/>
+              <a:rPr lang="en-US"/>
               <a:t>Third level</a:t>
             </a:r>
           </a:p>
           <a:p>
             <a:pPr lvl="3"/>
             <a:r>
-              <a:rPr lang="en-US" smtClean="0"/>
+              <a:rPr lang="en-US"/>
               <a:t>Fourth level</a:t>
             </a:r>
           </a:p>
           <a:p>
             <a:pPr lvl="4"/>
             <a:r>
-              <a:rPr lang="en-US" smtClean="0"/>
+              <a:rPr lang="en-US"/>
               <a:t>Fifth level</a:t>
             </a:r>
-            <a:endParaRPr lang="en-US"/>
           </a:p>
         </p:txBody>
       </p:sp>
@@ -7318,7 +7262,7 @@
           <a:p>
             <a:pPr lvl="0"/>
             <a:r>
-              <a:rPr lang="en-US" smtClean="0"/>
+              <a:rPr lang="en-US"/>
               <a:t>Click to edit Master text styles</a:t>
             </a:r>
           </a:p>
@@ -7341,7 +7285,7 @@
           <a:p>
             <a:fld id="{699DC775-C286-4358-8C92-D7E584E969B3}" type="datetimeFigureOut">
               <a:rPr lang="en-US" smtClean="0"/>
-              <a:t>30-Jun-15</a:t>
+              <a:t>1/23/2017</a:t>
             </a:fld>
             <a:endParaRPr lang="en-US"/>
           </a:p>
@@ -7444,10 +7388,9 @@
           </a:lstStyle>
           <a:p>
             <a:r>
-              <a:rPr lang="en-US" smtClean="0"/>
+              <a:rPr lang="en-US"/>
               <a:t>Click to edit Master title style</a:t>
             </a:r>
-            <a:endParaRPr lang="en-US"/>
           </a:p>
         </p:txBody>
       </p:sp>
@@ -7571,7 +7514,7 @@
           <a:p>
             <a:pPr lvl="0"/>
             <a:r>
-              <a:rPr lang="en-US" smtClean="0"/>
+              <a:rPr lang="en-US"/>
               <a:t>Click to edit Master text styles</a:t>
             </a:r>
           </a:p>
@@ -7594,7 +7537,7 @@
           <a:p>
             <a:fld id="{699DC775-C286-4358-8C92-D7E584E969B3}" type="datetimeFigureOut">
               <a:rPr lang="en-US" smtClean="0"/>
-              <a:t>30-Jun-15</a:t>
+              <a:t>1/23/2017</a:t>
             </a:fld>
             <a:endParaRPr lang="en-US"/>
           </a:p>
@@ -7703,10 +7646,9 @@
           <a:lstStyle/>
           <a:p>
             <a:r>
-              <a:rPr lang="en-US" smtClean="0"/>
+              <a:rPr lang="en-US"/>
               <a:t>Click to edit Master title style</a:t>
             </a:r>
-            <a:endParaRPr lang="en-US"/>
           </a:p>
         </p:txBody>
       </p:sp>
@@ -7737,38 +7679,37 @@
           <a:p>
             <a:pPr lvl="0"/>
             <a:r>
-              <a:rPr lang="en-US" smtClean="0"/>
+              <a:rPr lang="en-US"/>
               <a:t>Click to edit Master text styles</a:t>
             </a:r>
           </a:p>
           <a:p>
             <a:pPr lvl="1"/>
             <a:r>
-              <a:rPr lang="en-US" smtClean="0"/>
+              <a:rPr lang="en-US"/>
               <a:t>Second level</a:t>
             </a:r>
           </a:p>
           <a:p>
             <a:pPr lvl="2"/>
             <a:r>
-              <a:rPr lang="en-US" smtClean="0"/>
+              <a:rPr lang="en-US"/>
               <a:t>Third level</a:t>
             </a:r>
           </a:p>
           <a:p>
             <a:pPr lvl="3"/>
             <a:r>
-              <a:rPr lang="en-US" smtClean="0"/>
+              <a:rPr lang="en-US"/>
               <a:t>Fourth level</a:t>
             </a:r>
           </a:p>
           <a:p>
             <a:pPr lvl="4"/>
             <a:r>
-              <a:rPr lang="en-US" smtClean="0"/>
+              <a:rPr lang="en-US"/>
               <a:t>Fifth level</a:t>
             </a:r>
-            <a:endParaRPr lang="en-US"/>
           </a:p>
         </p:txBody>
       </p:sp>
@@ -7807,7 +7748,7 @@
           <a:p>
             <a:fld id="{699DC775-C286-4358-8C92-D7E584E969B3}" type="datetimeFigureOut">
               <a:rPr lang="en-US" smtClean="0"/>
-              <a:t>30-Jun-15</a:t>
+              <a:t>1/23/2017</a:t>
             </a:fld>
             <a:endParaRPr lang="en-US"/>
           </a:p>
@@ -8218,10 +8159,9 @@
           <a:lstStyle/>
           <a:p>
             <a:r>
-              <a:rPr lang="en-US" smtClean="0"/>
+              <a:rPr lang="en-US"/>
               <a:t>Click to edit Master title style</a:t>
             </a:r>
-            <a:endParaRPr lang="en-US"/>
           </a:p>
         </p:txBody>
       </p:sp>
@@ -8252,38 +8192,37 @@
           <a:p>
             <a:pPr lvl="0"/>
             <a:r>
-              <a:rPr lang="en-US" smtClean="0"/>
+              <a:rPr lang="en-US"/>
               <a:t>Click to edit Master text styles</a:t>
             </a:r>
           </a:p>
           <a:p>
             <a:pPr lvl="1"/>
             <a:r>
-              <a:rPr lang="en-US" smtClean="0"/>
+              <a:rPr lang="en-US"/>
               <a:t>Second level</a:t>
             </a:r>
           </a:p>
           <a:p>
             <a:pPr lvl="2"/>
             <a:r>
-              <a:rPr lang="en-US" smtClean="0"/>
+              <a:rPr lang="en-US"/>
               <a:t>Third level</a:t>
             </a:r>
           </a:p>
           <a:p>
             <a:pPr lvl="3"/>
             <a:r>
-              <a:rPr lang="en-US" smtClean="0"/>
+              <a:rPr lang="en-US"/>
               <a:t>Fourth level</a:t>
             </a:r>
           </a:p>
           <a:p>
             <a:pPr lvl="4"/>
             <a:r>
-              <a:rPr lang="en-US" smtClean="0"/>
+              <a:rPr lang="en-US"/>
               <a:t>Fifth level</a:t>
             </a:r>
-            <a:endParaRPr lang="en-US"/>
           </a:p>
         </p:txBody>
       </p:sp>
@@ -8322,7 +8261,7 @@
           <a:p>
             <a:fld id="{699DC775-C286-4358-8C92-D7E584E969B3}" type="datetimeFigureOut">
               <a:rPr lang="en-US" smtClean="0"/>
-              <a:t>30-Jun-15</a:t>
+              <a:t>1/23/2017</a:t>
             </a:fld>
             <a:endParaRPr lang="en-US"/>
           </a:p>
@@ -8731,10 +8670,9 @@
           <a:lstStyle/>
           <a:p>
             <a:r>
-              <a:rPr lang="en-US" dirty="0" smtClean="0"/>
+              <a:rPr lang="en-US" dirty="0"/>
               <a:t>Click to edit Master title style</a:t>
             </a:r>
-            <a:endParaRPr lang="en-US" dirty="0"/>
           </a:p>
         </p:txBody>
       </p:sp>
@@ -8765,38 +8703,37 @@
           <a:p>
             <a:pPr lvl="0"/>
             <a:r>
-              <a:rPr lang="en-US" smtClean="0"/>
+              <a:rPr lang="en-US"/>
               <a:t>Click to edit Master text styles</a:t>
             </a:r>
           </a:p>
           <a:p>
             <a:pPr lvl="1"/>
             <a:r>
-              <a:rPr lang="en-US" smtClean="0"/>
+              <a:rPr lang="en-US"/>
               <a:t>Second level</a:t>
             </a:r>
           </a:p>
           <a:p>
             <a:pPr lvl="2"/>
             <a:r>
-              <a:rPr lang="en-US" smtClean="0"/>
+              <a:rPr lang="en-US"/>
               <a:t>Third level</a:t>
             </a:r>
           </a:p>
           <a:p>
             <a:pPr lvl="3"/>
             <a:r>
-              <a:rPr lang="en-US" smtClean="0"/>
+              <a:rPr lang="en-US"/>
               <a:t>Fourth level</a:t>
             </a:r>
           </a:p>
           <a:p>
             <a:pPr lvl="4"/>
             <a:r>
-              <a:rPr lang="en-US" smtClean="0"/>
+              <a:rPr lang="en-US"/>
               <a:t>Fifth level</a:t>
             </a:r>
-            <a:endParaRPr lang="en-US"/>
           </a:p>
         </p:txBody>
       </p:sp>
@@ -8835,7 +8772,7 @@
           <a:p>
             <a:fld id="{699DC775-C286-4358-8C92-D7E584E969B3}" type="datetimeFigureOut">
               <a:rPr lang="en-US" smtClean="0"/>
-              <a:t>30-Jun-15</a:t>
+              <a:t>1/23/2017</a:t>
             </a:fld>
             <a:endParaRPr lang="en-US"/>
           </a:p>
@@ -9236,7 +9173,7 @@
           <a:p>
             <a:pPr algn="ctr"/>
             <a:r>
-              <a:rPr lang="en-US" b="1" smtClean="0">
+              <a:rPr lang="en-US" b="1">
                 <a:solidFill>
                   <a:srgbClr val="FFFF00"/>
                 </a:solidFill>
@@ -9247,18 +9184,13 @@
           <a:p>
             <a:pPr algn="ctr"/>
             <a:r>
-              <a:rPr lang="en-US" smtClean="0">
+              <a:rPr lang="en-US">
                 <a:solidFill>
                   <a:srgbClr val="FFFFFF"/>
                 </a:solidFill>
               </a:rPr>
               <a:t>Adjust the design of this slide and click the 'Sync Agenda' (in Agenda Lab) to replicate the design in the other slides.</a:t>
             </a:r>
-            <a:endParaRPr lang="en-US">
-              <a:solidFill>
-                <a:srgbClr val="FFFFFF"/>
-              </a:solidFill>
-            </a:endParaRPr>
           </a:p>
         </p:txBody>
       </p:sp>
@@ -9362,7 +9294,7 @@
             <a:p>
               <a:pPr algn="ctr"/>
               <a:r>
-                <a:rPr lang="en-US" sz="2800" dirty="0" smtClean="0">
+                <a:rPr lang="en-US" sz="2800" dirty="0">
                   <a:solidFill>
                     <a:srgbClr val="FF0000"/>
                   </a:solidFill>
@@ -9371,13 +9303,6 @@
                 </a:rPr>
                 <a:t>Highlighted</a:t>
               </a:r>
-              <a:endParaRPr lang="en-US" sz="2800" dirty="0">
-                <a:solidFill>
-                  <a:srgbClr val="FF0000"/>
-                </a:solidFill>
-                <a:latin typeface="Arial Black" pitchFamily="34" charset="0"/>
-                <a:cs typeface="Aharoni" pitchFamily="2" charset="-79"/>
-              </a:endParaRPr>
             </a:p>
           </p:txBody>
         </p:sp>
@@ -9405,18 +9330,13 @@
             <a:p>
               <a:pPr lvl="0"/>
               <a:r>
-                <a:rPr lang="en-US" smtClean="0">
+                <a:rPr lang="en-US">
                   <a:solidFill>
                     <a:srgbClr val="FFFFFF"/>
                   </a:solidFill>
                 </a:rPr>
                 <a:t>One Slide</a:t>
               </a:r>
-              <a:endParaRPr lang="en-US">
-                <a:solidFill>
-                  <a:srgbClr val="FFFFFF"/>
-                </a:solidFill>
-              </a:endParaRPr>
             </a:p>
           </p:txBody>
         </p:sp>
@@ -9444,18 +9364,13 @@
             <a:p>
               <a:pPr lvl="0"/>
               <a:r>
-                <a:rPr lang="en-US" smtClean="0">
+                <a:rPr lang="en-US">
                   <a:solidFill>
                     <a:srgbClr val="FFFFFF"/>
                   </a:solidFill>
                 </a:rPr>
                 <a:t>Same Name</a:t>
               </a:r>
-              <a:endParaRPr lang="en-US">
-                <a:solidFill>
-                  <a:srgbClr val="FFFFFF"/>
-                </a:solidFill>
-              </a:endParaRPr>
             </a:p>
           </p:txBody>
         </p:sp>
@@ -9483,18 +9398,13 @@
             <a:p>
               <a:pPr lvl="0"/>
               <a:r>
-                <a:rPr lang="en-US" smtClean="0">
+                <a:rPr lang="en-US">
                   <a:solidFill>
                     <a:srgbClr val="FFFFFF"/>
                   </a:solidFill>
                 </a:rPr>
                 <a:t>Same Name</a:t>
               </a:r>
-              <a:endParaRPr lang="en-US">
-                <a:solidFill>
-                  <a:srgbClr val="FFFFFF"/>
-                </a:solidFill>
-              </a:endParaRPr>
             </a:p>
           </p:txBody>
         </p:sp>
@@ -9522,7 +9432,7 @@
             <a:p>
               <a:pPr lvl="0"/>
               <a:r>
-                <a:rPr lang="en-US" sz="2400" b="1" smtClean="0">
+                <a:rPr lang="en-US" sz="2400" b="1">
                   <a:solidFill>
                     <a:srgbClr val="FFC000"/>
                   </a:solidFill>
@@ -9561,7 +9471,7 @@
             <a:p>
               <a:pPr lvl="0"/>
               <a:r>
-                <a:rPr lang="en-US" altLang="ja-JP" smtClean="0">
+                <a:rPr lang="en-US" altLang="ja-JP">
                   <a:solidFill>
                     <a:srgbClr val="FFFFFF"/>
                   </a:solidFill>
@@ -9600,7 +9510,7 @@
             <a:p>
               <a:pPr lvl="0"/>
               <a:r>
-                <a:rPr lang="el-GR" smtClean="0">
+                <a:rPr lang="el-GR">
                   <a:solidFill>
                     <a:srgbClr val="FFFFFF"/>
                   </a:solidFill>
@@ -9626,14 +9536,6 @@
   <p:clrMapOvr>
     <a:masterClrMapping/>
   </p:clrMapOvr>
-  <mc:AlternateContent xmlns:mc="http://schemas.openxmlformats.org/markup-compatibility/2006" xmlns:p14="http://schemas.microsoft.com/office/powerpoint/2010/main">
-    <mc:Choice Requires="p14">
-      <p:transition spd="slow" p14:dur="2000"/>
-    </mc:Choice>
-    <mc:Fallback xmlns="">
-      <p:transition spd="slow"/>
-    </mc:Fallback>
-  </mc:AlternateContent>
   <p:timing>
     <p:tnLst>
       <p:par>
@@ -9869,18 +9771,13 @@
             <a:p>
               <a:pPr lvl="0"/>
               <a:r>
-                <a:rPr lang="en-US" smtClean="0">
+                <a:rPr lang="en-US">
                   <a:solidFill>
                     <a:srgbClr val="FFFFFF"/>
                   </a:solidFill>
                 </a:rPr>
                 <a:t>One Slide</a:t>
               </a:r>
-              <a:endParaRPr lang="en-US">
-                <a:solidFill>
-                  <a:srgbClr val="FFFFFF"/>
-                </a:solidFill>
-              </a:endParaRPr>
             </a:p>
           </p:txBody>
         </p:sp>
@@ -9908,18 +9805,13 @@
             <a:p>
               <a:pPr lvl="0"/>
               <a:r>
-                <a:rPr lang="en-US" smtClean="0">
+                <a:rPr lang="en-US">
                   <a:solidFill>
                     <a:srgbClr val="FFFFFF"/>
                   </a:solidFill>
                 </a:rPr>
                 <a:t>Same Name</a:t>
               </a:r>
-              <a:endParaRPr lang="en-US">
-                <a:solidFill>
-                  <a:srgbClr val="FFFFFF"/>
-                </a:solidFill>
-              </a:endParaRPr>
             </a:p>
           </p:txBody>
         </p:sp>
@@ -9947,18 +9839,13 @@
             <a:p>
               <a:pPr lvl="0"/>
               <a:r>
-                <a:rPr lang="en-US" smtClean="0">
+                <a:rPr lang="en-US">
                   <a:solidFill>
                     <a:srgbClr val="FFFFFF"/>
                   </a:solidFill>
                 </a:rPr>
                 <a:t>Same Name</a:t>
               </a:r>
-              <a:endParaRPr lang="en-US">
-                <a:solidFill>
-                  <a:srgbClr val="FFFFFF"/>
-                </a:solidFill>
-              </a:endParaRPr>
             </a:p>
           </p:txBody>
         </p:sp>
@@ -9986,7 +9873,7 @@
             <a:p>
               <a:pPr lvl="0"/>
               <a:r>
-                <a:rPr lang="en-US" sz="2400" b="1" smtClean="0">
+                <a:rPr lang="en-US" sz="2400" b="1">
                   <a:solidFill>
                     <a:srgbClr val="FFC000"/>
                   </a:solidFill>
@@ -10025,7 +9912,7 @@
             <a:p>
               <a:pPr lvl="0" algn="ctr"/>
               <a:r>
-                <a:rPr lang="en-US" sz="2800" smtClean="0">
+                <a:rPr lang="en-US" sz="2800">
                   <a:solidFill>
                     <a:srgbClr val="FF0000"/>
                   </a:solidFill>
@@ -10068,7 +9955,7 @@
             <a:p>
               <a:pPr lvl="0"/>
               <a:r>
-                <a:rPr lang="el-GR" smtClean="0">
+                <a:rPr lang="el-GR">
                   <a:solidFill>
                     <a:srgbClr val="FFFFFF"/>
                   </a:solidFill>
@@ -10094,13 +9981,6 @@
   <p:clrMapOvr>
     <a:masterClrMapping/>
   </p:clrMapOvr>
-  <p:timing>
-    <p:tnLst>
-      <p:par>
-        <p:cTn id="1" dur="indefinite" restart="never" nodeType="tmRoot"/>
-      </p:par>
-    </p:tnLst>
-  </p:timing>
 </p:sld>
 </file>
 
@@ -10228,18 +10108,13 @@
             <a:p>
               <a:pPr lvl="0"/>
               <a:r>
-                <a:rPr lang="en-US" smtClean="0">
+                <a:rPr lang="en-US">
                   <a:solidFill>
                     <a:srgbClr val="FFFFFF"/>
                   </a:solidFill>
                 </a:rPr>
                 <a:t>One Slide</a:t>
               </a:r>
-              <a:endParaRPr lang="en-US">
-                <a:solidFill>
-                  <a:srgbClr val="FFFFFF"/>
-                </a:solidFill>
-              </a:endParaRPr>
             </a:p>
           </p:txBody>
         </p:sp>
@@ -10267,18 +10142,13 @@
             <a:p>
               <a:pPr lvl="0"/>
               <a:r>
-                <a:rPr lang="en-US" smtClean="0">
+                <a:rPr lang="en-US">
                   <a:solidFill>
                     <a:srgbClr val="FFFFFF"/>
                   </a:solidFill>
                 </a:rPr>
                 <a:t>Same Name</a:t>
               </a:r>
-              <a:endParaRPr lang="en-US">
-                <a:solidFill>
-                  <a:srgbClr val="FFFFFF"/>
-                </a:solidFill>
-              </a:endParaRPr>
             </a:p>
           </p:txBody>
         </p:sp>
@@ -10306,18 +10176,13 @@
             <a:p>
               <a:pPr lvl="0"/>
               <a:r>
-                <a:rPr lang="en-US" smtClean="0">
+                <a:rPr lang="en-US">
                   <a:solidFill>
                     <a:srgbClr val="FFFFFF"/>
                   </a:solidFill>
                 </a:rPr>
                 <a:t>Same Name</a:t>
               </a:r>
-              <a:endParaRPr lang="en-US">
-                <a:solidFill>
-                  <a:srgbClr val="FFFFFF"/>
-                </a:solidFill>
-              </a:endParaRPr>
             </a:p>
           </p:txBody>
         </p:sp>
@@ -10345,7 +10210,7 @@
             <a:p>
               <a:pPr lvl="0"/>
               <a:r>
-                <a:rPr lang="en-US" sz="2400" b="1" smtClean="0">
+                <a:rPr lang="en-US" sz="2400" b="1">
                   <a:solidFill>
                     <a:srgbClr val="FFC000"/>
                   </a:solidFill>
@@ -10384,7 +10249,7 @@
             <a:p>
               <a:pPr lvl="0" algn="ctr"/>
               <a:r>
-                <a:rPr lang="en-US" sz="2800" smtClean="0">
+                <a:rPr lang="en-US" sz="2800">
                   <a:solidFill>
                     <a:srgbClr val="FF0000"/>
                   </a:solidFill>
@@ -10427,7 +10292,7 @@
             <a:p>
               <a:pPr lvl="0"/>
               <a:r>
-                <a:rPr lang="el-GR" smtClean="0">
+                <a:rPr lang="el-GR">
                   <a:solidFill>
                     <a:srgbClr val="FFFFFF"/>
                   </a:solidFill>
@@ -10453,13 +10318,6 @@
   <p:clrMapOvr>
     <a:masterClrMapping/>
   </p:clrMapOvr>
-  <p:timing>
-    <p:tnLst>
-      <p:par>
-        <p:cTn id="1" dur="indefinite" restart="never" nodeType="tmRoot"/>
-      </p:par>
-    </p:tnLst>
-  </p:timing>
 </p:sld>
 </file>
 
@@ -10578,18 +10436,13 @@
             <a:p>
               <a:pPr lvl="0"/>
               <a:r>
-                <a:rPr lang="en-US" smtClean="0">
+                <a:rPr lang="en-US">
                   <a:solidFill>
                     <a:srgbClr val="FFFFFF"/>
                   </a:solidFill>
                 </a:rPr>
                 <a:t>One Slide</a:t>
               </a:r>
-              <a:endParaRPr lang="en-US">
-                <a:solidFill>
-                  <a:srgbClr val="FFFFFF"/>
-                </a:solidFill>
-              </a:endParaRPr>
             </a:p>
           </p:txBody>
         </p:sp>
@@ -10617,18 +10470,13 @@
             <a:p>
               <a:pPr lvl="0"/>
               <a:r>
-                <a:rPr lang="en-US" smtClean="0">
+                <a:rPr lang="en-US">
                   <a:solidFill>
                     <a:srgbClr val="FFFFFF"/>
                   </a:solidFill>
                 </a:rPr>
                 <a:t>Same Name</a:t>
               </a:r>
-              <a:endParaRPr lang="en-US">
-                <a:solidFill>
-                  <a:srgbClr val="FFFFFF"/>
-                </a:solidFill>
-              </a:endParaRPr>
             </a:p>
           </p:txBody>
         </p:sp>
@@ -10656,18 +10504,13 @@
             <a:p>
               <a:pPr lvl="0"/>
               <a:r>
-                <a:rPr lang="en-US" smtClean="0">
+                <a:rPr lang="en-US">
                   <a:solidFill>
                     <a:srgbClr val="FFFFFF"/>
                   </a:solidFill>
                 </a:rPr>
                 <a:t>Same Name</a:t>
               </a:r>
-              <a:endParaRPr lang="en-US">
-                <a:solidFill>
-                  <a:srgbClr val="FFFFFF"/>
-                </a:solidFill>
-              </a:endParaRPr>
             </a:p>
           </p:txBody>
         </p:sp>
@@ -10695,7 +10538,7 @@
             <a:p>
               <a:pPr lvl="0"/>
               <a:r>
-                <a:rPr lang="en-US" sz="2400" b="1" smtClean="0">
+                <a:rPr lang="en-US" sz="2400" b="1">
                   <a:solidFill>
                     <a:srgbClr val="FFC000"/>
                   </a:solidFill>
@@ -10734,7 +10577,7 @@
             <a:p>
               <a:pPr lvl="0" algn="ctr"/>
               <a:r>
-                <a:rPr lang="en-US" sz="2800" smtClean="0">
+                <a:rPr lang="en-US" sz="2800">
                   <a:solidFill>
                     <a:srgbClr val="FF0000"/>
                   </a:solidFill>
@@ -10777,7 +10620,7 @@
             <a:p>
               <a:pPr lvl="0"/>
               <a:r>
-                <a:rPr lang="el-GR" smtClean="0">
+                <a:rPr lang="el-GR">
                   <a:solidFill>
                     <a:srgbClr val="FFFFFF"/>
                   </a:solidFill>
@@ -10803,13 +10646,6 @@
   <p:clrMapOvr>
     <a:masterClrMapping/>
   </p:clrMapOvr>
-  <p:timing>
-    <p:tnLst>
-      <p:par>
-        <p:cTn id="1" dur="indefinite" restart="never" nodeType="tmRoot"/>
-      </p:par>
-    </p:tnLst>
-  </p:timing>
 </p:sld>
 </file>
 
@@ -10936,18 +10772,13 @@
             <a:p>
               <a:pPr lvl="0"/>
               <a:r>
-                <a:rPr lang="en-US" smtClean="0">
+                <a:rPr lang="en-US">
                   <a:solidFill>
                     <a:srgbClr val="FFFFFF"/>
                   </a:solidFill>
                 </a:rPr>
                 <a:t>One Slide</a:t>
               </a:r>
-              <a:endParaRPr lang="en-US">
-                <a:solidFill>
-                  <a:srgbClr val="FFFFFF"/>
-                </a:solidFill>
-              </a:endParaRPr>
             </a:p>
           </p:txBody>
         </p:sp>
@@ -10975,18 +10806,13 @@
             <a:p>
               <a:pPr lvl="0"/>
               <a:r>
-                <a:rPr lang="en-US" smtClean="0">
+                <a:rPr lang="en-US">
                   <a:solidFill>
                     <a:srgbClr val="FFFFFF"/>
                   </a:solidFill>
                 </a:rPr>
                 <a:t>Same Name</a:t>
               </a:r>
-              <a:endParaRPr lang="en-US">
-                <a:solidFill>
-                  <a:srgbClr val="FFFFFF"/>
-                </a:solidFill>
-              </a:endParaRPr>
             </a:p>
           </p:txBody>
         </p:sp>
@@ -11014,18 +10840,13 @@
             <a:p>
               <a:pPr lvl="0"/>
               <a:r>
-                <a:rPr lang="en-US" smtClean="0">
+                <a:rPr lang="en-US">
                   <a:solidFill>
                     <a:srgbClr val="FFFFFF"/>
                   </a:solidFill>
                 </a:rPr>
                 <a:t>Same Name</a:t>
               </a:r>
-              <a:endParaRPr lang="en-US">
-                <a:solidFill>
-                  <a:srgbClr val="FFFFFF"/>
-                </a:solidFill>
-              </a:endParaRPr>
             </a:p>
           </p:txBody>
         </p:sp>
@@ -11053,7 +10874,7 @@
             <a:p>
               <a:pPr lvl="0"/>
               <a:r>
-                <a:rPr lang="en-US" sz="2400" b="1" smtClean="0">
+                <a:rPr lang="en-US" sz="2400" b="1">
                   <a:solidFill>
                     <a:srgbClr val="FFC000"/>
                   </a:solidFill>
@@ -11092,7 +10913,7 @@
             <a:p>
               <a:pPr lvl="0"/>
               <a:r>
-                <a:rPr lang="en-US" altLang="ja-JP" smtClean="0">
+                <a:rPr lang="en-US" altLang="ja-JP">
                   <a:solidFill>
                     <a:srgbClr val="FFFFFF"/>
                   </a:solidFill>
@@ -11131,7 +10952,7 @@
             <a:p>
               <a:pPr lvl="0" algn="ctr"/>
               <a:r>
-                <a:rPr lang="el-GR" sz="2800" smtClean="0">
+                <a:rPr lang="el-GR" sz="2800">
                   <a:solidFill>
                     <a:srgbClr val="FF0000"/>
                   </a:solidFill>
@@ -11161,19 +10982,12 @@
   <p:clrMapOvr>
     <a:masterClrMapping/>
   </p:clrMapOvr>
-  <p:timing>
-    <p:tnLst>
-      <p:par>
-        <p:cTn id="1" dur="indefinite" restart="never" nodeType="tmRoot"/>
-      </p:par>
-    </p:tnLst>
-  </p:timing>
 </p:sld>
 </file>
 
 <file path=ppt/slides/slide14.xml><?xml version="1.0" encoding="utf-8"?>
 <p:sld xmlns:a="http://schemas.openxmlformats.org/drawingml/2006/main" xmlns:r="http://schemas.openxmlformats.org/officeDocument/2006/relationships" xmlns:p="http://schemas.openxmlformats.org/presentationml/2006/main" show="0">
-  <p:cSld name="PPTLabsAcknowledgementSlide">
+  <p:cSld>
     <p:spTree>
       <p:nvGrpSpPr>
         <p:cNvPr id="1" name=""/>
@@ -11192,7 +11006,7 @@
         <p:nvPicPr>
           <p:cNvPr id="2" name="Picture 1"/>
           <p:cNvPicPr>
-            <a:picLocks/>
+            <a:picLocks noChangeAspect="1"/>
           </p:cNvPicPr>
           <p:nvPr/>
         </p:nvPicPr>
@@ -11210,8 +11024,8 @@
         </p:blipFill>
         <p:spPr>
           <a:xfrm>
-            <a:off x="649224" y="992124"/>
-            <a:ext cx="7845552" cy="4873752"/>
+            <a:off x="0" y="1029202"/>
+            <a:ext cx="9144000" cy="4799596"/>
           </a:xfrm>
           <a:prstGeom prst="rect">
             <a:avLst/>
@@ -11221,21 +11035,13 @@
     </p:spTree>
     <p:extLst>
       <p:ext uri="{BB962C8B-B14F-4D97-AF65-F5344CB8AC3E}">
-        <p14:creationId xmlns:p14="http://schemas.microsoft.com/office/powerpoint/2010/main" val="956531809"/>
+        <p14:creationId xmlns:p14="http://schemas.microsoft.com/office/powerpoint/2010/main" val="3041392037"/>
       </p:ext>
     </p:extLst>
   </p:cSld>
   <p:clrMapOvr>
     <a:masterClrMapping/>
   </p:clrMapOvr>
-  <mc:AlternateContent xmlns:mc="http://schemas.openxmlformats.org/markup-compatibility/2006" xmlns:p14="http://schemas.microsoft.com/office/powerpoint/2010/main">
-    <mc:Choice Requires="p14">
-      <p:transition spd="slow" p14:dur="2000"/>
-    </mc:Choice>
-    <mc:Fallback xmlns="">
-      <p:transition spd="slow"/>
-    </mc:Fallback>
-  </mc:AlternateContent>
 </p:sld>
 </file>
 
@@ -11274,7 +11080,7 @@
           <a:lstStyle/>
           <a:p>
             <a:r>
-              <a:rPr lang="en-US" sz="5400" b="1" dirty="0" err="1" smtClean="0">
+              <a:rPr lang="en-US" sz="5400" b="1" dirty="0" err="1">
                 <a:solidFill>
                   <a:schemeClr val="accent6">
                     <a:lumMod val="75000"/>
@@ -11284,7 +11090,7 @@
               <a:t>PowerPointLabs</a:t>
             </a:r>
             <a:r>
-              <a:rPr lang="en-US" sz="5400" b="1" dirty="0" smtClean="0">
+              <a:rPr lang="en-US" sz="5400" b="1" dirty="0">
                 <a:solidFill>
                   <a:schemeClr val="accent6">
                     <a:lumMod val="75000"/>
@@ -11322,7 +11128,7 @@
               <a:buNone/>
             </a:pPr>
             <a:r>
-              <a:rPr lang="en-US" b="1" dirty="0" smtClean="0">
+              <a:rPr lang="en-US" b="1" dirty="0">
                 <a:solidFill>
                   <a:srgbClr val="0070C0"/>
                 </a:solidFill>
@@ -11333,34 +11139,21 @@
           <a:p>
             <a:pPr marL="285750" indent="-285750"/>
             <a:r>
-              <a:rPr lang="en-US" b="1" dirty="0" smtClean="0">
-                <a:solidFill>
-                  <a:srgbClr val="0070C0"/>
-                </a:solidFill>
-              </a:rPr>
-              <a:t>DO </a:t>
-            </a:r>
-            <a:r>
               <a:rPr lang="en-US" b="1" dirty="0">
                 <a:solidFill>
                   <a:srgbClr val="0070C0"/>
                 </a:solidFill>
               </a:rPr>
-              <a:t>NOT SAVE </a:t>
-            </a:r>
-            <a:r>
-              <a:rPr lang="en-US" dirty="0" smtClean="0">
+              <a:t>DO NOT SAVE </a:t>
+            </a:r>
+            <a:r>
+              <a:rPr lang="en-US" dirty="0">
                 <a:solidFill>
                   <a:srgbClr val="0070C0"/>
                 </a:solidFill>
               </a:rPr>
               <a:t>these slides after testing. Keep this file in its original form.</a:t>
             </a:r>
-            <a:endParaRPr lang="en-US" dirty="0">
-              <a:solidFill>
-                <a:srgbClr val="0070C0"/>
-              </a:solidFill>
-            </a:endParaRPr>
           </a:p>
           <a:p>
             <a:pPr marL="285750" indent="-285750"/>
@@ -11370,47 +11163,7 @@
                   <a:srgbClr val="0070C0"/>
                 </a:solidFill>
               </a:rPr>
-              <a:t>If </a:t>
-            </a:r>
-            <a:r>
-              <a:rPr lang="en-US" dirty="0" smtClean="0">
-                <a:solidFill>
-                  <a:srgbClr val="0070C0"/>
-                </a:solidFill>
-              </a:rPr>
-              <a:t>your </a:t>
-            </a:r>
-            <a:r>
-              <a:rPr lang="en-US" dirty="0">
-                <a:solidFill>
-                  <a:srgbClr val="0070C0"/>
-                </a:solidFill>
-              </a:rPr>
-              <a:t>result </a:t>
-            </a:r>
-            <a:r>
-              <a:rPr lang="en-US" dirty="0" smtClean="0">
-                <a:solidFill>
-                  <a:srgbClr val="0070C0"/>
-                </a:solidFill>
-              </a:rPr>
-              <a:t>is different from the </a:t>
-            </a:r>
-            <a:r>
-              <a:rPr lang="en-US" dirty="0">
-                <a:solidFill>
-                  <a:srgbClr val="0070C0"/>
-                </a:solidFill>
-              </a:rPr>
-              <a:t>expected output, </a:t>
-            </a:r>
-            <a:r>
-              <a:rPr lang="en-US" dirty="0" smtClean="0">
-                <a:solidFill>
-                  <a:srgbClr val="0070C0"/>
-                </a:solidFill>
-              </a:rPr>
-              <a:t>please submit a bug report (attach slides/screenshots as necessary).</a:t>
+              <a:t>If your result is different from the expected output, please submit a bug report (attach slides/screenshots as necessary).</a:t>
             </a:r>
             <a:endParaRPr lang="en-SG" dirty="0">
               <a:solidFill>
@@ -11433,13 +11186,6 @@
   <p:clrMapOvr>
     <a:masterClrMapping/>
   </p:clrMapOvr>
-  <p:timing>
-    <p:tnLst>
-      <p:par>
-        <p:cTn id="1" dur="indefinite" restart="never" nodeType="tmRoot"/>
-      </p:par>
-    </p:tnLst>
-  </p:timing>
 </p:sld>
 </file>
 
@@ -11494,7 +11240,7 @@
           <a:p>
             <a:pPr algn="l"/>
             <a:r>
-              <a:rPr lang="en-US" sz="7200" dirty="0" smtClean="0">
+              <a:rPr lang="en-US" sz="7200" dirty="0">
                 <a:solidFill>
                   <a:schemeClr val="bg1"/>
                 </a:solidFill>
@@ -11532,7 +11278,7 @@
           <a:lstStyle/>
           <a:p>
             <a:r>
-              <a:rPr lang="en-US" sz="2400" b="1" dirty="0" smtClean="0">
+              <a:rPr lang="en-US" sz="2400" b="1" dirty="0">
                 <a:solidFill>
                   <a:schemeClr val="bg1"/>
                 </a:solidFill>
@@ -11546,7 +11292,7 @@
               <a:buChar char="•"/>
             </a:pPr>
             <a:r>
-              <a:rPr lang="en-US" sz="2400" dirty="0" smtClean="0">
+              <a:rPr lang="en-US" sz="2400" dirty="0">
                 <a:solidFill>
                   <a:schemeClr val="bg1"/>
                 </a:solidFill>
@@ -11566,13 +11312,6 @@
   <p:clrMapOvr>
     <a:masterClrMapping/>
   </p:clrMapOvr>
-  <p:timing>
-    <p:tnLst>
-      <p:par>
-        <p:cTn id="1" dur="indefinite" restart="never" nodeType="tmRoot"/>
-      </p:par>
-    </p:tnLst>
-  </p:timing>
 </p:sld>
 </file>
 
@@ -11730,10 +11469,9 @@
           </a:lstStyle>
           <a:p>
             <a:r>
-              <a:rPr lang="en-US" dirty="0" smtClean="0"/>
+              <a:rPr lang="en-US" dirty="0"/>
               <a:t>Pattern</a:t>
             </a:r>
-            <a:endParaRPr lang="en-US" dirty="0"/>
           </a:p>
         </p:txBody>
       </p:sp>
@@ -11747,13 +11485,6 @@
   <p:clrMapOvr>
     <a:masterClrMapping/>
   </p:clrMapOvr>
-  <p:timing>
-    <p:tnLst>
-      <p:par>
-        <p:cTn id="1" dur="indefinite" restart="never" nodeType="tmRoot"/>
-      </p:par>
-    </p:tnLst>
-  </p:timing>
 </p:sld>
 </file>
 
@@ -11872,18 +11603,13 @@
             <a:p>
               <a:pPr lvl="0"/>
               <a:r>
-                <a:rPr lang="en-US" smtClean="0">
+                <a:rPr lang="en-US">
                   <a:solidFill>
                     <a:srgbClr val="FFFFFF"/>
                   </a:solidFill>
                 </a:rPr>
                 <a:t>One Slide</a:t>
               </a:r>
-              <a:endParaRPr lang="en-US">
-                <a:solidFill>
-                  <a:srgbClr val="FFFFFF"/>
-                </a:solidFill>
-              </a:endParaRPr>
             </a:p>
           </p:txBody>
         </p:sp>
@@ -11911,18 +11637,13 @@
             <a:p>
               <a:pPr lvl="0"/>
               <a:r>
-                <a:rPr lang="en-US" smtClean="0">
+                <a:rPr lang="en-US">
                   <a:solidFill>
                     <a:srgbClr val="FFFFFF"/>
                   </a:solidFill>
                 </a:rPr>
                 <a:t>Same Name</a:t>
               </a:r>
-              <a:endParaRPr lang="en-US">
-                <a:solidFill>
-                  <a:srgbClr val="FFFFFF"/>
-                </a:solidFill>
-              </a:endParaRPr>
             </a:p>
           </p:txBody>
         </p:sp>
@@ -11950,7 +11671,7 @@
             <a:p>
               <a:pPr lvl="0" algn="ctr"/>
               <a:r>
-                <a:rPr lang="en-US" sz="2800" smtClean="0">
+                <a:rPr lang="en-US" sz="2800">
                   <a:solidFill>
                     <a:srgbClr val="FF0000"/>
                   </a:solidFill>
@@ -11993,7 +11714,7 @@
             <a:p>
               <a:pPr lvl="0"/>
               <a:r>
-                <a:rPr lang="en-US" sz="2400" b="1" smtClean="0">
+                <a:rPr lang="en-US" sz="2400" b="1">
                   <a:solidFill>
                     <a:srgbClr val="FFC000"/>
                   </a:solidFill>
@@ -12032,7 +11753,7 @@
             <a:p>
               <a:pPr lvl="0"/>
               <a:r>
-                <a:rPr lang="en-US" altLang="ja-JP" smtClean="0">
+                <a:rPr lang="en-US" altLang="ja-JP">
                   <a:solidFill>
                     <a:srgbClr val="FFFFFF"/>
                   </a:solidFill>
@@ -12071,7 +11792,7 @@
             <a:p>
               <a:pPr lvl="0"/>
               <a:r>
-                <a:rPr lang="el-GR" smtClean="0">
+                <a:rPr lang="el-GR">
                   <a:solidFill>
                     <a:srgbClr val="FFFFFF"/>
                   </a:solidFill>
@@ -12097,13 +11818,6 @@
   <p:clrMapOvr>
     <a:masterClrMapping/>
   </p:clrMapOvr>
-  <p:timing>
-    <p:tnLst>
-      <p:par>
-        <p:cTn id="1" dur="indefinite" restart="never" nodeType="tmRoot"/>
-      </p:par>
-    </p:tnLst>
-  </p:timing>
 </p:sld>
 </file>
 
@@ -12177,7 +11891,7 @@
           <a:lstStyle/>
           <a:p>
             <a:r>
-              <a:rPr lang="en-US" sz="6000" dirty="0" smtClean="0"/>
+              <a:rPr lang="en-US" sz="6000" dirty="0"/>
               <a:t>Test Image</a:t>
             </a:r>
             <a:endParaRPr lang="en-SG" sz="6000" dirty="0"/>
@@ -12282,18 +11996,13 @@
             <a:p>
               <a:pPr lvl="0"/>
               <a:r>
-                <a:rPr lang="en-US" smtClean="0">
+                <a:rPr lang="en-US">
                   <a:solidFill>
                     <a:srgbClr val="FFFFFF"/>
                   </a:solidFill>
                 </a:rPr>
                 <a:t>One Slide</a:t>
               </a:r>
-              <a:endParaRPr lang="en-US">
-                <a:solidFill>
-                  <a:srgbClr val="FFFFFF"/>
-                </a:solidFill>
-              </a:endParaRPr>
             </a:p>
           </p:txBody>
         </p:sp>
@@ -12321,18 +12030,13 @@
             <a:p>
               <a:pPr lvl="0"/>
               <a:r>
-                <a:rPr lang="en-US" smtClean="0">
+                <a:rPr lang="en-US">
                   <a:solidFill>
                     <a:srgbClr val="FFFFFF"/>
                   </a:solidFill>
                 </a:rPr>
                 <a:t>Same Name</a:t>
               </a:r>
-              <a:endParaRPr lang="en-US">
-                <a:solidFill>
-                  <a:srgbClr val="FFFFFF"/>
-                </a:solidFill>
-              </a:endParaRPr>
             </a:p>
           </p:txBody>
         </p:sp>
@@ -12360,18 +12064,13 @@
             <a:p>
               <a:pPr lvl="0"/>
               <a:r>
-                <a:rPr lang="en-US" smtClean="0">
+                <a:rPr lang="en-US">
                   <a:solidFill>
                     <a:srgbClr val="FFFFFF"/>
                   </a:solidFill>
                 </a:rPr>
                 <a:t>Same Name</a:t>
               </a:r>
-              <a:endParaRPr lang="en-US">
-                <a:solidFill>
-                  <a:srgbClr val="FFFFFF"/>
-                </a:solidFill>
-              </a:endParaRPr>
             </a:p>
           </p:txBody>
         </p:sp>
@@ -12399,7 +12098,7 @@
             <a:p>
               <a:pPr lvl="0" algn="ctr"/>
               <a:r>
-                <a:rPr lang="en-US" sz="2800" smtClean="0">
+                <a:rPr lang="en-US" sz="2800">
                   <a:solidFill>
                     <a:srgbClr val="FF0000"/>
                   </a:solidFill>
@@ -12442,7 +12141,7 @@
             <a:p>
               <a:pPr lvl="0"/>
               <a:r>
-                <a:rPr lang="en-US" altLang="ja-JP" smtClean="0">
+                <a:rPr lang="en-US" altLang="ja-JP">
                   <a:solidFill>
                     <a:srgbClr val="FFFFFF"/>
                   </a:solidFill>
@@ -12481,7 +12180,7 @@
             <a:p>
               <a:pPr lvl="0"/>
               <a:r>
-                <a:rPr lang="el-GR" smtClean="0">
+                <a:rPr lang="el-GR">
                   <a:solidFill>
                     <a:srgbClr val="FFFFFF"/>
                   </a:solidFill>
@@ -12507,13 +12206,6 @@
   <p:clrMapOvr>
     <a:masterClrMapping/>
   </p:clrMapOvr>
-  <p:timing>
-    <p:tnLst>
-      <p:par>
-        <p:cTn id="1" dur="indefinite" restart="never" nodeType="tmRoot"/>
-      </p:par>
-    </p:tnLst>
-  </p:timing>
 </p:sld>
 </file>
 
@@ -12632,18 +12324,13 @@
             <a:p>
               <a:pPr lvl="0"/>
               <a:r>
-                <a:rPr lang="en-US" smtClean="0">
+                <a:rPr lang="en-US">
                   <a:solidFill>
                     <a:srgbClr val="FFFFFF"/>
                   </a:solidFill>
                 </a:rPr>
                 <a:t>One Slide</a:t>
               </a:r>
-              <a:endParaRPr lang="en-US">
-                <a:solidFill>
-                  <a:srgbClr val="FFFFFF"/>
-                </a:solidFill>
-              </a:endParaRPr>
             </a:p>
           </p:txBody>
         </p:sp>
@@ -12671,18 +12358,13 @@
             <a:p>
               <a:pPr lvl="0"/>
               <a:r>
-                <a:rPr lang="en-US" smtClean="0">
+                <a:rPr lang="en-US">
                   <a:solidFill>
                     <a:srgbClr val="FFFFFF"/>
                   </a:solidFill>
                 </a:rPr>
                 <a:t>Same Name</a:t>
               </a:r>
-              <a:endParaRPr lang="en-US">
-                <a:solidFill>
-                  <a:srgbClr val="FFFFFF"/>
-                </a:solidFill>
-              </a:endParaRPr>
             </a:p>
           </p:txBody>
         </p:sp>
@@ -12710,18 +12392,13 @@
             <a:p>
               <a:pPr lvl="0"/>
               <a:r>
-                <a:rPr lang="en-US" smtClean="0">
+                <a:rPr lang="en-US">
                   <a:solidFill>
                     <a:srgbClr val="FFFFFF"/>
                   </a:solidFill>
                 </a:rPr>
                 <a:t>Same Name</a:t>
               </a:r>
-              <a:endParaRPr lang="en-US">
-                <a:solidFill>
-                  <a:srgbClr val="FFFFFF"/>
-                </a:solidFill>
-              </a:endParaRPr>
             </a:p>
           </p:txBody>
         </p:sp>
@@ -12749,7 +12426,7 @@
             <a:p>
               <a:pPr lvl="0" algn="ctr"/>
               <a:r>
-                <a:rPr lang="en-US" sz="2800" smtClean="0">
+                <a:rPr lang="en-US" sz="2800">
                   <a:solidFill>
                     <a:srgbClr val="FF0000"/>
                   </a:solidFill>
@@ -12792,7 +12469,7 @@
             <a:p>
               <a:pPr lvl="0"/>
               <a:r>
-                <a:rPr lang="en-US" altLang="ja-JP" smtClean="0">
+                <a:rPr lang="en-US" altLang="ja-JP">
                   <a:solidFill>
                     <a:srgbClr val="FFFFFF"/>
                   </a:solidFill>
@@ -12831,7 +12508,7 @@
             <a:p>
               <a:pPr lvl="0"/>
               <a:r>
-                <a:rPr lang="el-GR" smtClean="0">
+                <a:rPr lang="el-GR">
                   <a:solidFill>
                     <a:srgbClr val="FFFFFF"/>
                   </a:solidFill>
@@ -12857,13 +12534,6 @@
   <p:clrMapOvr>
     <a:masterClrMapping/>
   </p:clrMapOvr>
-  <p:timing>
-    <p:tnLst>
-      <p:par>
-        <p:cTn id="1" dur="indefinite" restart="never" nodeType="tmRoot"/>
-      </p:par>
-    </p:tnLst>
-  </p:timing>
 </p:sld>
 </file>
 
@@ -12937,7 +12607,7 @@
           <a:lstStyle/>
           <a:p>
             <a:r>
-              <a:rPr lang="en-US" sz="6000" dirty="0" smtClean="0"/>
+              <a:rPr lang="en-US" sz="6000" dirty="0"/>
               <a:t>Test Image</a:t>
             </a:r>
             <a:endParaRPr lang="en-SG" sz="6000" dirty="0"/>
@@ -13042,18 +12712,13 @@
             <a:p>
               <a:pPr lvl="0"/>
               <a:r>
-                <a:rPr lang="en-US" smtClean="0">
+                <a:rPr lang="en-US">
                   <a:solidFill>
                     <a:srgbClr val="FFFFFF"/>
                   </a:solidFill>
                 </a:rPr>
                 <a:t>One Slide</a:t>
               </a:r>
-              <a:endParaRPr lang="en-US">
-                <a:solidFill>
-                  <a:srgbClr val="FFFFFF"/>
-                </a:solidFill>
-              </a:endParaRPr>
             </a:p>
           </p:txBody>
         </p:sp>
@@ -13081,18 +12746,13 @@
             <a:p>
               <a:pPr lvl="0"/>
               <a:r>
-                <a:rPr lang="en-US" smtClean="0">
+                <a:rPr lang="en-US">
                   <a:solidFill>
                     <a:srgbClr val="FFFFFF"/>
                   </a:solidFill>
                 </a:rPr>
                 <a:t>Same Name</a:t>
               </a:r>
-              <a:endParaRPr lang="en-US">
-                <a:solidFill>
-                  <a:srgbClr val="FFFFFF"/>
-                </a:solidFill>
-              </a:endParaRPr>
             </a:p>
           </p:txBody>
         </p:sp>
@@ -13120,18 +12780,13 @@
             <a:p>
               <a:pPr lvl="0"/>
               <a:r>
-                <a:rPr lang="en-US" smtClean="0">
+                <a:rPr lang="en-US">
                   <a:solidFill>
                     <a:srgbClr val="FFFFFF"/>
                   </a:solidFill>
                 </a:rPr>
                 <a:t>Same Name</a:t>
               </a:r>
-              <a:endParaRPr lang="en-US">
-                <a:solidFill>
-                  <a:srgbClr val="FFFFFF"/>
-                </a:solidFill>
-              </a:endParaRPr>
             </a:p>
           </p:txBody>
         </p:sp>
@@ -13159,7 +12814,7 @@
             <a:p>
               <a:pPr lvl="0"/>
               <a:r>
-                <a:rPr lang="en-US" sz="2400" b="1" smtClean="0">
+                <a:rPr lang="en-US" sz="2400" b="1">
                   <a:solidFill>
                     <a:srgbClr val="FFC000"/>
                   </a:solidFill>
@@ -13198,7 +12853,7 @@
             <a:p>
               <a:pPr lvl="0" algn="ctr"/>
               <a:r>
-                <a:rPr lang="en-US" sz="2800" smtClean="0">
+                <a:rPr lang="en-US" sz="2800">
                   <a:solidFill>
                     <a:srgbClr val="FF0000"/>
                   </a:solidFill>
@@ -13241,7 +12896,7 @@
             <a:p>
               <a:pPr lvl="0"/>
               <a:r>
-                <a:rPr lang="el-GR" smtClean="0">
+                <a:rPr lang="el-GR">
                   <a:solidFill>
                     <a:srgbClr val="FFFFFF"/>
                   </a:solidFill>
@@ -13267,13 +12922,6 @@
   <p:clrMapOvr>
     <a:masterClrMapping/>
   </p:clrMapOvr>
-  <p:timing>
-    <p:tnLst>
-      <p:par>
-        <p:cTn id="1" dur="indefinite" restart="never" nodeType="tmRoot"/>
-      </p:par>
-    </p:tnLst>
-  </p:timing>
 </p:sld>
 </file>
 
@@ -13317,7 +12965,7 @@
           <a:lstStyle/>
           <a:p>
             <a:r>
-              <a:rPr lang="en-US" sz="6000" dirty="0" smtClean="0"/>
+              <a:rPr lang="en-US" sz="6000" dirty="0"/>
               <a:t>A long section</a:t>
             </a:r>
             <a:endParaRPr lang="en-SG" sz="6000" dirty="0"/>
@@ -13334,13 +12982,6 @@
   <p:clrMapOvr>
     <a:masterClrMapping/>
   </p:clrMapOvr>
-  <p:timing>
-    <p:tnLst>
-      <p:par>
-        <p:cTn id="1" dur="indefinite" restart="never" nodeType="tmRoot"/>
-      </p:par>
-    </p:tnLst>
-  </p:timing>
 </p:sld>
 </file>
 

</xml_diff>